<commit_message>
Edited powerpoint and script Script: only removed empty lines and unused code
</commit_message>
<xml_diff>
--- a/GPRCommunities.pptx
+++ b/GPRCommunities.pptx
@@ -5,7 +5,7 @@
     <p:sldMasterId id="2147483648" r:id="rId1"/>
   </p:sldMasterIdLst>
   <p:notesMasterIdLst>
-    <p:notesMasterId r:id="rId17"/>
+    <p:notesMasterId r:id="rId20"/>
   </p:notesMasterIdLst>
   <p:sldIdLst>
     <p:sldId id="256" r:id="rId2"/>
@@ -20,9 +20,12 @@
     <p:sldId id="272" r:id="rId11"/>
     <p:sldId id="275" r:id="rId12"/>
     <p:sldId id="265" r:id="rId13"/>
-    <p:sldId id="259" r:id="rId14"/>
-    <p:sldId id="274" r:id="rId15"/>
-    <p:sldId id="273" r:id="rId16"/>
+    <p:sldId id="274" r:id="rId14"/>
+    <p:sldId id="277" r:id="rId15"/>
+    <p:sldId id="276" r:id="rId16"/>
+    <p:sldId id="259" r:id="rId17"/>
+    <p:sldId id="278" r:id="rId18"/>
+    <p:sldId id="273" r:id="rId19"/>
   </p:sldIdLst>
   <p:sldSz cx="12192000" cy="6858000"/>
   <p:notesSz cx="6858000" cy="9144000"/>
@@ -211,7 +214,7 @@
           <a:p>
             <a:fld id="{C6C72B9D-EF0C-4E16-A6A8-6793C8460034}" type="datetimeFigureOut">
               <a:rPr lang="en-US" smtClean="0"/>
-              <a:t>7/25/2023</a:t>
+              <a:t>7/26/2023</a:t>
             </a:fld>
             <a:endParaRPr lang="en-US"/>
           </a:p>
@@ -1762,7 +1765,7 @@
           <a:p>
             <a:fld id="{58D99F9D-2103-4E0F-8EC4-FC1F4C4457DE}" type="datetimeFigureOut">
               <a:rPr lang="en-US" smtClean="0"/>
-              <a:t>7/25/2023</a:t>
+              <a:t>7/26/2023</a:t>
             </a:fld>
             <a:endParaRPr lang="en-US"/>
           </a:p>
@@ -1960,7 +1963,7 @@
           <a:p>
             <a:fld id="{58D99F9D-2103-4E0F-8EC4-FC1F4C4457DE}" type="datetimeFigureOut">
               <a:rPr lang="en-US" smtClean="0"/>
-              <a:t>7/25/2023</a:t>
+              <a:t>7/26/2023</a:t>
             </a:fld>
             <a:endParaRPr lang="en-US"/>
           </a:p>
@@ -2168,7 +2171,7 @@
           <a:p>
             <a:fld id="{58D99F9D-2103-4E0F-8EC4-FC1F4C4457DE}" type="datetimeFigureOut">
               <a:rPr lang="en-US" smtClean="0"/>
-              <a:t>7/25/2023</a:t>
+              <a:t>7/26/2023</a:t>
             </a:fld>
             <a:endParaRPr lang="en-US"/>
           </a:p>
@@ -2366,7 +2369,7 @@
           <a:p>
             <a:fld id="{58D99F9D-2103-4E0F-8EC4-FC1F4C4457DE}" type="datetimeFigureOut">
               <a:rPr lang="en-US" smtClean="0"/>
-              <a:t>7/25/2023</a:t>
+              <a:t>7/26/2023</a:t>
             </a:fld>
             <a:endParaRPr lang="en-US"/>
           </a:p>
@@ -2641,7 +2644,7 @@
           <a:p>
             <a:fld id="{58D99F9D-2103-4E0F-8EC4-FC1F4C4457DE}" type="datetimeFigureOut">
               <a:rPr lang="en-US" smtClean="0"/>
-              <a:t>7/25/2023</a:t>
+              <a:t>7/26/2023</a:t>
             </a:fld>
             <a:endParaRPr lang="en-US"/>
           </a:p>
@@ -2906,7 +2909,7 @@
           <a:p>
             <a:fld id="{58D99F9D-2103-4E0F-8EC4-FC1F4C4457DE}" type="datetimeFigureOut">
               <a:rPr lang="en-US" smtClean="0"/>
-              <a:t>7/25/2023</a:t>
+              <a:t>7/26/2023</a:t>
             </a:fld>
             <a:endParaRPr lang="en-US"/>
           </a:p>
@@ -3318,7 +3321,7 @@
           <a:p>
             <a:fld id="{58D99F9D-2103-4E0F-8EC4-FC1F4C4457DE}" type="datetimeFigureOut">
               <a:rPr lang="en-US" smtClean="0"/>
-              <a:t>7/25/2023</a:t>
+              <a:t>7/26/2023</a:t>
             </a:fld>
             <a:endParaRPr lang="en-US"/>
           </a:p>
@@ -3459,7 +3462,7 @@
           <a:p>
             <a:fld id="{58D99F9D-2103-4E0F-8EC4-FC1F4C4457DE}" type="datetimeFigureOut">
               <a:rPr lang="en-US" smtClean="0"/>
-              <a:t>7/25/2023</a:t>
+              <a:t>7/26/2023</a:t>
             </a:fld>
             <a:endParaRPr lang="en-US"/>
           </a:p>
@@ -3572,7 +3575,7 @@
           <a:p>
             <a:fld id="{58D99F9D-2103-4E0F-8EC4-FC1F4C4457DE}" type="datetimeFigureOut">
               <a:rPr lang="en-US" smtClean="0"/>
-              <a:t>7/25/2023</a:t>
+              <a:t>7/26/2023</a:t>
             </a:fld>
             <a:endParaRPr lang="en-US"/>
           </a:p>
@@ -3883,7 +3886,7 @@
           <a:p>
             <a:fld id="{58D99F9D-2103-4E0F-8EC4-FC1F4C4457DE}" type="datetimeFigureOut">
               <a:rPr lang="en-US" smtClean="0"/>
-              <a:t>7/25/2023</a:t>
+              <a:t>7/26/2023</a:t>
             </a:fld>
             <a:endParaRPr lang="en-US"/>
           </a:p>
@@ -4171,7 +4174,7 @@
           <a:p>
             <a:fld id="{58D99F9D-2103-4E0F-8EC4-FC1F4C4457DE}" type="datetimeFigureOut">
               <a:rPr lang="en-US" smtClean="0"/>
-              <a:t>7/25/2023</a:t>
+              <a:t>7/26/2023</a:t>
             </a:fld>
             <a:endParaRPr lang="en-US"/>
           </a:p>
@@ -4412,7 +4415,7 @@
           <a:p>
             <a:fld id="{58D99F9D-2103-4E0F-8EC4-FC1F4C4457DE}" type="datetimeFigureOut">
               <a:rPr lang="en-US" smtClean="0"/>
-              <a:t>7/25/2023</a:t>
+              <a:t>7/26/2023</a:t>
             </a:fld>
             <a:endParaRPr lang="en-US"/>
           </a:p>
@@ -5116,6 +5119,14 @@
 <file path=ppt/slides/slide12.xml><?xml version="1.0" encoding="utf-8"?>
 <p:sld xmlns:a="http://schemas.openxmlformats.org/drawingml/2006/main" xmlns:r="http://schemas.openxmlformats.org/officeDocument/2006/relationships" xmlns:p="http://schemas.openxmlformats.org/presentationml/2006/main">
   <p:cSld>
+    <p:bg>
+      <p:bgPr>
+        <a:solidFill>
+          <a:schemeClr val="bg1"/>
+        </a:solidFill>
+        <a:effectLst/>
+      </p:bgPr>
+    </p:bg>
     <p:spTree>
       <p:nvGrpSpPr>
         <p:cNvPr id="1" name=""/>
@@ -5130,6 +5141,401 @@
           <a:chExt cx="0" cy="0"/>
         </a:xfrm>
       </p:grpSpPr>
+      <p:sp useBgFill="1">
+        <p:nvSpPr>
+          <p:cNvPr id="10" name="Rectangle 9">
+            <a:extLst>
+              <a:ext uri="{FF2B5EF4-FFF2-40B4-BE49-F238E27FC236}">
+                <a16:creationId xmlns:a16="http://schemas.microsoft.com/office/drawing/2014/main" id="{0288C6B4-AFC3-407F-A595-EFFD38D4CCAF}"/>
+              </a:ext>
+              <a:ext uri="{C183D7F6-B498-43B3-948B-1728B52AA6E4}">
+                <adec:decorative xmlns:adec="http://schemas.microsoft.com/office/drawing/2017/decorative" val="1"/>
+              </a:ext>
+            </a:extLst>
+          </p:cNvPr>
+          <p:cNvSpPr>
+            <a:spLocks noGrp="1" noRot="1" noChangeAspect="1" noMove="1" noResize="1" noEditPoints="1" noAdjustHandles="1" noChangeArrowheads="1" noChangeShapeType="1" noTextEdit="1"/>
+          </p:cNvSpPr>
+          <p:nvPr>
+            <p:extLst>
+              <p:ext uri="{386F3935-93C4-4BCD-93E2-E3B085C9AB24}">
+                <p16:designElem xmlns:p16="http://schemas.microsoft.com/office/powerpoint/2015/main" val="1"/>
+              </p:ext>
+            </p:extLst>
+          </p:nvPr>
+        </p:nvSpPr>
+        <p:spPr>
+          <a:xfrm>
+            <a:off x="0" y="0"/>
+            <a:ext cx="12192000" cy="6858000"/>
+          </a:xfrm>
+          <a:prstGeom prst="rect">
+            <a:avLst/>
+          </a:prstGeom>
+          <a:ln>
+            <a:noFill/>
+          </a:ln>
+        </p:spPr>
+        <p:style>
+          <a:lnRef idx="2">
+            <a:schemeClr val="accent1">
+              <a:shade val="50000"/>
+            </a:schemeClr>
+          </a:lnRef>
+          <a:fillRef idx="1">
+            <a:schemeClr val="accent1"/>
+          </a:fillRef>
+          <a:effectRef idx="0">
+            <a:schemeClr val="accent1"/>
+          </a:effectRef>
+          <a:fontRef idx="minor">
+            <a:schemeClr val="lt1"/>
+          </a:fontRef>
+        </p:style>
+        <p:txBody>
+          <a:bodyPr rtlCol="0" anchor="ctr"/>
+          <a:lstStyle/>
+          <a:p>
+            <a:pPr algn="ctr"/>
+            <a:endParaRPr lang="en-US"/>
+          </a:p>
+        </p:txBody>
+      </p:sp>
+      <p:sp useBgFill="1">
+        <p:nvSpPr>
+          <p:cNvPr id="12" name="Freeform: Shape 11">
+            <a:extLst>
+              <a:ext uri="{FF2B5EF4-FFF2-40B4-BE49-F238E27FC236}">
+                <a16:creationId xmlns:a16="http://schemas.microsoft.com/office/drawing/2014/main" id="{CF236821-17FE-429B-8D2C-08E13A64EA40}"/>
+              </a:ext>
+              <a:ext uri="{C183D7F6-B498-43B3-948B-1728B52AA6E4}">
+                <adec:decorative xmlns:adec="http://schemas.microsoft.com/office/drawing/2017/decorative" val="1"/>
+              </a:ext>
+            </a:extLst>
+          </p:cNvPr>
+          <p:cNvSpPr>
+            <a:spLocks noGrp="1" noRot="1" noChangeAspect="1" noMove="1" noResize="1" noEditPoints="1" noAdjustHandles="1" noChangeArrowheads="1" noChangeShapeType="1" noTextEdit="1"/>
+          </p:cNvSpPr>
+          <p:nvPr>
+            <p:extLst>
+              <p:ext uri="{386F3935-93C4-4BCD-93E2-E3B085C9AB24}">
+                <p16:designElem xmlns:p16="http://schemas.microsoft.com/office/powerpoint/2015/main" val="1"/>
+              </p:ext>
+            </p:extLst>
+          </p:nvPr>
+        </p:nvSpPr>
+        <p:spPr>
+          <a:xfrm>
+            <a:off x="-1" y="0"/>
+            <a:ext cx="4455673" cy="6858000"/>
+          </a:xfrm>
+          <a:custGeom>
+            <a:avLst/>
+            <a:gdLst>
+              <a:gd name="connsiteX0" fmla="*/ 0 w 4455673"/>
+              <a:gd name="connsiteY0" fmla="*/ 0 h 6858000"/>
+              <a:gd name="connsiteX1" fmla="*/ 3242695 w 4455673"/>
+              <a:gd name="connsiteY1" fmla="*/ 0 h 6858000"/>
+              <a:gd name="connsiteX2" fmla="*/ 3305678 w 4455673"/>
+              <a:gd name="connsiteY2" fmla="*/ 69271 h 6858000"/>
+              <a:gd name="connsiteX3" fmla="*/ 4455673 w 4455673"/>
+              <a:gd name="connsiteY3" fmla="*/ 3429000 h 6858000"/>
+              <a:gd name="connsiteX4" fmla="*/ 3305678 w 4455673"/>
+              <a:gd name="connsiteY4" fmla="*/ 6788730 h 6858000"/>
+              <a:gd name="connsiteX5" fmla="*/ 3242695 w 4455673"/>
+              <a:gd name="connsiteY5" fmla="*/ 6858000 h 6858000"/>
+              <a:gd name="connsiteX6" fmla="*/ 0 w 4455673"/>
+              <a:gd name="connsiteY6" fmla="*/ 6858000 h 6858000"/>
+            </a:gdLst>
+            <a:ahLst/>
+            <a:cxnLst>
+              <a:cxn ang="0">
+                <a:pos x="connsiteX0" y="connsiteY0"/>
+              </a:cxn>
+              <a:cxn ang="0">
+                <a:pos x="connsiteX1" y="connsiteY1"/>
+              </a:cxn>
+              <a:cxn ang="0">
+                <a:pos x="connsiteX2" y="connsiteY2"/>
+              </a:cxn>
+              <a:cxn ang="0">
+                <a:pos x="connsiteX3" y="connsiteY3"/>
+              </a:cxn>
+              <a:cxn ang="0">
+                <a:pos x="connsiteX4" y="connsiteY4"/>
+              </a:cxn>
+              <a:cxn ang="0">
+                <a:pos x="connsiteX5" y="connsiteY5"/>
+              </a:cxn>
+              <a:cxn ang="0">
+                <a:pos x="connsiteX6" y="connsiteY6"/>
+              </a:cxn>
+            </a:cxnLst>
+            <a:rect l="l" t="t" r="r" b="b"/>
+            <a:pathLst>
+              <a:path w="4455673" h="6858000">
+                <a:moveTo>
+                  <a:pt x="0" y="0"/>
+                </a:moveTo>
+                <a:lnTo>
+                  <a:pt x="3242695" y="0"/>
+                </a:lnTo>
+                <a:lnTo>
+                  <a:pt x="3305678" y="69271"/>
+                </a:lnTo>
+                <a:cubicBezTo>
+                  <a:pt x="4016204" y="929100"/>
+                  <a:pt x="4455673" y="2116944"/>
+                  <a:pt x="4455673" y="3429000"/>
+                </a:cubicBezTo>
+                <a:cubicBezTo>
+                  <a:pt x="4455673" y="4741056"/>
+                  <a:pt x="4016204" y="5928900"/>
+                  <a:pt x="3305678" y="6788730"/>
+                </a:cubicBezTo>
+                <a:lnTo>
+                  <a:pt x="3242695" y="6858000"/>
+                </a:lnTo>
+                <a:lnTo>
+                  <a:pt x="0" y="6858000"/>
+                </a:lnTo>
+                <a:close/>
+              </a:path>
+            </a:pathLst>
+          </a:custGeom>
+          <a:ln w="9525">
+            <a:solidFill>
+              <a:srgbClr val="EFEFEF"/>
+            </a:solidFill>
+          </a:ln>
+          <a:effectLst>
+            <a:outerShdw blurRad="88900" dist="38100" algn="l" rotWithShape="0">
+              <a:schemeClr val="bg1">
+                <a:lumMod val="85000"/>
+                <a:alpha val="50000"/>
+              </a:schemeClr>
+            </a:outerShdw>
+          </a:effectLst>
+        </p:spPr>
+        <p:style>
+          <a:lnRef idx="2">
+            <a:schemeClr val="accent1">
+              <a:shade val="50000"/>
+            </a:schemeClr>
+          </a:lnRef>
+          <a:fillRef idx="1">
+            <a:schemeClr val="accent1"/>
+          </a:fillRef>
+          <a:effectRef idx="0">
+            <a:schemeClr val="accent1"/>
+          </a:effectRef>
+          <a:fontRef idx="minor">
+            <a:schemeClr val="lt1"/>
+          </a:fontRef>
+        </p:style>
+        <p:txBody>
+          <a:bodyPr wrap="square" rtlCol="0" anchor="ctr">
+            <a:noAutofit/>
+          </a:bodyPr>
+          <a:lstStyle/>
+          <a:p>
+            <a:pPr marL="0" marR="0" lvl="0" indent="0" algn="ctr" defTabSz="914400" rtl="0" eaLnBrk="1" fontAlgn="auto" latinLnBrk="0" hangingPunct="1">
+              <a:lnSpc>
+                <a:spcPct val="100000"/>
+              </a:lnSpc>
+              <a:spcBef>
+                <a:spcPts val="0"/>
+              </a:spcBef>
+              <a:spcAft>
+                <a:spcPts val="0"/>
+              </a:spcAft>
+              <a:buClrTx/>
+              <a:buSzTx/>
+              <a:buFontTx/>
+              <a:buNone/>
+              <a:tabLst/>
+              <a:defRPr/>
+            </a:pPr>
+            <a:endParaRPr kumimoji="0" lang="en-US" sz="1800" b="0" i="0" u="none" strike="noStrike" kern="1200" cap="none" spc="0" normalizeH="0" baseline="0" noProof="0">
+              <a:ln>
+                <a:noFill/>
+              </a:ln>
+              <a:solidFill>
+                <a:prstClr val="white"/>
+              </a:solidFill>
+              <a:effectLst/>
+              <a:uLnTx/>
+              <a:uFillTx/>
+              <a:latin typeface="Calibri" panose="020F0502020204030204"/>
+              <a:ea typeface="+mn-ea"/>
+              <a:cs typeface="+mn-cs"/>
+            </a:endParaRPr>
+          </a:p>
+        </p:txBody>
+      </p:sp>
+      <p:sp useBgFill="1">
+        <p:nvSpPr>
+          <p:cNvPr id="14" name="Freeform: Shape 13">
+            <a:extLst>
+              <a:ext uri="{FF2B5EF4-FFF2-40B4-BE49-F238E27FC236}">
+                <a16:creationId xmlns:a16="http://schemas.microsoft.com/office/drawing/2014/main" id="{C0BDBCD2-E081-43AB-9119-C55465E59757}"/>
+              </a:ext>
+              <a:ext uri="{C183D7F6-B498-43B3-948B-1728B52AA6E4}">
+                <adec:decorative xmlns:adec="http://schemas.microsoft.com/office/drawing/2017/decorative" val="1"/>
+              </a:ext>
+            </a:extLst>
+          </p:cNvPr>
+          <p:cNvSpPr>
+            <a:spLocks noGrp="1" noRot="1" noChangeAspect="1" noMove="1" noResize="1" noEditPoints="1" noAdjustHandles="1" noChangeArrowheads="1" noChangeShapeType="1" noTextEdit="1"/>
+          </p:cNvSpPr>
+          <p:nvPr>
+            <p:extLst>
+              <p:ext uri="{386F3935-93C4-4BCD-93E2-E3B085C9AB24}">
+                <p16:designElem xmlns:p16="http://schemas.microsoft.com/office/powerpoint/2015/main" val="1"/>
+              </p:ext>
+            </p:extLst>
+          </p:nvPr>
+        </p:nvSpPr>
+        <p:spPr>
+          <a:xfrm>
+            <a:off x="0" y="0"/>
+            <a:ext cx="4446529" cy="6858000"/>
+          </a:xfrm>
+          <a:custGeom>
+            <a:avLst/>
+            <a:gdLst>
+              <a:gd name="connsiteX0" fmla="*/ 0 w 4446529"/>
+              <a:gd name="connsiteY0" fmla="*/ 0 h 6858000"/>
+              <a:gd name="connsiteX1" fmla="*/ 3233551 w 4446529"/>
+              <a:gd name="connsiteY1" fmla="*/ 0 h 6858000"/>
+              <a:gd name="connsiteX2" fmla="*/ 3296534 w 4446529"/>
+              <a:gd name="connsiteY2" fmla="*/ 69271 h 6858000"/>
+              <a:gd name="connsiteX3" fmla="*/ 4446529 w 4446529"/>
+              <a:gd name="connsiteY3" fmla="*/ 3429000 h 6858000"/>
+              <a:gd name="connsiteX4" fmla="*/ 3296534 w 4446529"/>
+              <a:gd name="connsiteY4" fmla="*/ 6788730 h 6858000"/>
+              <a:gd name="connsiteX5" fmla="*/ 3233551 w 4446529"/>
+              <a:gd name="connsiteY5" fmla="*/ 6858000 h 6858000"/>
+              <a:gd name="connsiteX6" fmla="*/ 0 w 4446529"/>
+              <a:gd name="connsiteY6" fmla="*/ 6858000 h 6858000"/>
+            </a:gdLst>
+            <a:ahLst/>
+            <a:cxnLst>
+              <a:cxn ang="0">
+                <a:pos x="connsiteX0" y="connsiteY0"/>
+              </a:cxn>
+              <a:cxn ang="0">
+                <a:pos x="connsiteX1" y="connsiteY1"/>
+              </a:cxn>
+              <a:cxn ang="0">
+                <a:pos x="connsiteX2" y="connsiteY2"/>
+              </a:cxn>
+              <a:cxn ang="0">
+                <a:pos x="connsiteX3" y="connsiteY3"/>
+              </a:cxn>
+              <a:cxn ang="0">
+                <a:pos x="connsiteX4" y="connsiteY4"/>
+              </a:cxn>
+              <a:cxn ang="0">
+                <a:pos x="connsiteX5" y="connsiteY5"/>
+              </a:cxn>
+              <a:cxn ang="0">
+                <a:pos x="connsiteX6" y="connsiteY6"/>
+              </a:cxn>
+            </a:cxnLst>
+            <a:rect l="l" t="t" r="r" b="b"/>
+            <a:pathLst>
+              <a:path w="4446529" h="6858000">
+                <a:moveTo>
+                  <a:pt x="0" y="0"/>
+                </a:moveTo>
+                <a:lnTo>
+                  <a:pt x="3233551" y="0"/>
+                </a:lnTo>
+                <a:lnTo>
+                  <a:pt x="3296534" y="69271"/>
+                </a:lnTo>
+                <a:cubicBezTo>
+                  <a:pt x="4007060" y="929100"/>
+                  <a:pt x="4446529" y="2116944"/>
+                  <a:pt x="4446529" y="3429000"/>
+                </a:cubicBezTo>
+                <a:cubicBezTo>
+                  <a:pt x="4446529" y="4741056"/>
+                  <a:pt x="4007060" y="5928900"/>
+                  <a:pt x="3296534" y="6788730"/>
+                </a:cubicBezTo>
+                <a:lnTo>
+                  <a:pt x="3233551" y="6858000"/>
+                </a:lnTo>
+                <a:lnTo>
+                  <a:pt x="0" y="6858000"/>
+                </a:lnTo>
+                <a:close/>
+              </a:path>
+            </a:pathLst>
+          </a:custGeom>
+          <a:ln w="9525">
+            <a:noFill/>
+          </a:ln>
+          <a:effectLst/>
+        </p:spPr>
+        <p:style>
+          <a:lnRef idx="2">
+            <a:schemeClr val="accent1">
+              <a:shade val="50000"/>
+            </a:schemeClr>
+          </a:lnRef>
+          <a:fillRef idx="1">
+            <a:schemeClr val="accent1"/>
+          </a:fillRef>
+          <a:effectRef idx="0">
+            <a:schemeClr val="accent1"/>
+          </a:effectRef>
+          <a:fontRef idx="minor">
+            <a:schemeClr val="lt1"/>
+          </a:fontRef>
+        </p:style>
+        <p:txBody>
+          <a:bodyPr wrap="square" rtlCol="0" anchor="ctr">
+            <a:noAutofit/>
+          </a:bodyPr>
+          <a:lstStyle/>
+          <a:p>
+            <a:pPr marL="0" marR="0" lvl="0" indent="0" algn="ctr" defTabSz="914400" rtl="0" eaLnBrk="1" fontAlgn="auto" latinLnBrk="0" hangingPunct="1">
+              <a:lnSpc>
+                <a:spcPct val="100000"/>
+              </a:lnSpc>
+              <a:spcBef>
+                <a:spcPts val="0"/>
+              </a:spcBef>
+              <a:spcAft>
+                <a:spcPts val="0"/>
+              </a:spcAft>
+              <a:buClrTx/>
+              <a:buSzTx/>
+              <a:buFontTx/>
+              <a:buNone/>
+              <a:tabLst/>
+              <a:defRPr/>
+            </a:pPr>
+            <a:endParaRPr kumimoji="0" lang="en-US" sz="1800" b="0" i="0" u="none" strike="noStrike" kern="1200" cap="none" spc="0" normalizeH="0" baseline="0" noProof="0">
+              <a:ln>
+                <a:noFill/>
+              </a:ln>
+              <a:solidFill>
+                <a:prstClr val="white"/>
+              </a:solidFill>
+              <a:effectLst/>
+              <a:uLnTx/>
+              <a:uFillTx/>
+              <a:latin typeface="Calibri" panose="020F0502020204030204"/>
+              <a:ea typeface="+mn-ea"/>
+              <a:cs typeface="+mn-cs"/>
+            </a:endParaRPr>
+          </a:p>
+        </p:txBody>
+      </p:sp>
       <p:sp>
         <p:nvSpPr>
           <p:cNvPr id="2" name="Title 1">
@@ -5146,48 +5552,318 @@
             <p:ph type="title"/>
           </p:nvPr>
         </p:nvSpPr>
-        <p:spPr/>
+        <p:spPr>
+          <a:xfrm>
+            <a:off x="371094" y="1161288"/>
+            <a:ext cx="3438144" cy="1239012"/>
+          </a:xfrm>
+        </p:spPr>
+        <p:txBody>
+          <a:bodyPr anchor="ctr">
+            <a:normAutofit/>
+          </a:bodyPr>
+          <a:lstStyle/>
+          <a:p>
+            <a:r>
+              <a:rPr lang="en-US" sz="2800"/>
+              <a:t>Gaussian Processes Script</a:t>
+            </a:r>
+          </a:p>
+        </p:txBody>
+      </p:sp>
+      <p:sp>
+        <p:nvSpPr>
+          <p:cNvPr id="16" name="Rectangle 15">
+            <a:extLst>
+              <a:ext uri="{FF2B5EF4-FFF2-40B4-BE49-F238E27FC236}">
+                <a16:creationId xmlns:a16="http://schemas.microsoft.com/office/drawing/2014/main" id="{98E79BE4-34FE-485A-98A5-92CE8F7C4743}"/>
+              </a:ext>
+              <a:ext uri="{C183D7F6-B498-43B3-948B-1728B52AA6E4}">
+                <adec:decorative xmlns:adec="http://schemas.microsoft.com/office/drawing/2017/decorative" val="1"/>
+              </a:ext>
+            </a:extLst>
+          </p:cNvPr>
+          <p:cNvSpPr>
+            <a:spLocks noGrp="1" noRot="1" noChangeAspect="1" noMove="1" noResize="1" noEditPoints="1" noAdjustHandles="1" noChangeArrowheads="1" noChangeShapeType="1" noTextEdit="1"/>
+          </p:cNvSpPr>
+          <p:nvPr>
+            <p:extLst>
+              <p:ext uri="{386F3935-93C4-4BCD-93E2-E3B085C9AB24}">
+                <p16:designElem xmlns:p16="http://schemas.microsoft.com/office/powerpoint/2015/main" val="1"/>
+              </p:ext>
+            </p:extLst>
+          </p:nvPr>
+        </p:nvSpPr>
+        <p:spPr>
+          <a:xfrm>
+            <a:off x="0" y="1426546"/>
+            <a:ext cx="128016" cy="653903"/>
+          </a:xfrm>
+          <a:prstGeom prst="rect">
+            <a:avLst/>
+          </a:prstGeom>
+          <a:solidFill>
+            <a:schemeClr val="accent2"/>
+          </a:solidFill>
+          <a:ln>
+            <a:noFill/>
+          </a:ln>
+        </p:spPr>
+        <p:style>
+          <a:lnRef idx="2">
+            <a:schemeClr val="accent1">
+              <a:shade val="50000"/>
+            </a:schemeClr>
+          </a:lnRef>
+          <a:fillRef idx="1">
+            <a:schemeClr val="accent1"/>
+          </a:fillRef>
+          <a:effectRef idx="0">
+            <a:schemeClr val="accent1"/>
+          </a:effectRef>
+          <a:fontRef idx="minor">
+            <a:schemeClr val="lt1"/>
+          </a:fontRef>
+        </p:style>
+        <p:txBody>
+          <a:bodyPr rtlCol="0" anchor="ctr"/>
+          <a:lstStyle/>
+          <a:p>
+            <a:pPr algn="ctr"/>
+            <a:endParaRPr lang="en-US">
+              <a:solidFill>
+                <a:prstClr val="white"/>
+              </a:solidFill>
+              <a:latin typeface="Calibri" panose="020F0502020204030204"/>
+            </a:endParaRPr>
+          </a:p>
+        </p:txBody>
+      </p:sp>
+      <p:sp>
+        <p:nvSpPr>
+          <p:cNvPr id="18" name="Rectangle 17">
+            <a:extLst>
+              <a:ext uri="{FF2B5EF4-FFF2-40B4-BE49-F238E27FC236}">
+                <a16:creationId xmlns:a16="http://schemas.microsoft.com/office/drawing/2014/main" id="{7A5F0580-5EE9-419F-96EE-B6529EF6E7D0}"/>
+              </a:ext>
+              <a:ext uri="{C183D7F6-B498-43B3-948B-1728B52AA6E4}">
+                <adec:decorative xmlns:adec="http://schemas.microsoft.com/office/drawing/2017/decorative" val="1"/>
+              </a:ext>
+            </a:extLst>
+          </p:cNvPr>
+          <p:cNvSpPr>
+            <a:spLocks noGrp="1" noRot="1" noChangeAspect="1" noMove="1" noResize="1" noEditPoints="1" noAdjustHandles="1" noChangeArrowheads="1" noChangeShapeType="1" noTextEdit="1"/>
+          </p:cNvSpPr>
+          <p:nvPr>
+            <p:extLst>
+              <p:ext uri="{386F3935-93C4-4BCD-93E2-E3B085C9AB24}">
+                <p16:designElem xmlns:p16="http://schemas.microsoft.com/office/powerpoint/2015/main" val="1"/>
+              </p:ext>
+            </p:extLst>
+          </p:nvPr>
+        </p:nvSpPr>
+        <p:spPr>
+          <a:xfrm>
+            <a:off x="395893" y="2443480"/>
+            <a:ext cx="3383280" cy="18288"/>
+          </a:xfrm>
+          <a:prstGeom prst="rect">
+            <a:avLst/>
+          </a:prstGeom>
+          <a:solidFill>
+            <a:srgbClr val="D5D5D5"/>
+          </a:solidFill>
+          <a:ln w="3175">
+            <a:noFill/>
+          </a:ln>
+          <a:effectLst/>
+        </p:spPr>
+        <p:style>
+          <a:lnRef idx="2">
+            <a:schemeClr val="accent1">
+              <a:shade val="50000"/>
+            </a:schemeClr>
+          </a:lnRef>
+          <a:fillRef idx="1">
+            <a:schemeClr val="accent1"/>
+          </a:fillRef>
+          <a:effectRef idx="0">
+            <a:schemeClr val="accent1"/>
+          </a:effectRef>
+          <a:fontRef idx="minor">
+            <a:schemeClr val="lt1"/>
+          </a:fontRef>
+        </p:style>
+        <p:txBody>
+          <a:bodyPr rtlCol="0" anchor="ctr"/>
+          <a:lstStyle/>
+          <a:p>
+            <a:pPr marL="0" marR="0" lvl="0" indent="0" algn="ctr" defTabSz="914400" rtl="0" eaLnBrk="1" fontAlgn="auto" latinLnBrk="0" hangingPunct="1">
+              <a:lnSpc>
+                <a:spcPct val="100000"/>
+              </a:lnSpc>
+              <a:spcBef>
+                <a:spcPts val="0"/>
+              </a:spcBef>
+              <a:spcAft>
+                <a:spcPts val="0"/>
+              </a:spcAft>
+              <a:buClrTx/>
+              <a:buSzTx/>
+              <a:buFontTx/>
+              <a:buNone/>
+              <a:tabLst/>
+              <a:defRPr/>
+            </a:pPr>
+            <a:endParaRPr kumimoji="0" lang="en-US" sz="1800" b="0" i="0" u="none" strike="noStrike" kern="1200" cap="none" spc="0" normalizeH="0" baseline="0" noProof="0">
+              <a:ln>
+                <a:noFill/>
+              </a:ln>
+              <a:solidFill>
+                <a:prstClr val="white"/>
+              </a:solidFill>
+              <a:effectLst/>
+              <a:uLnTx/>
+              <a:uFillTx/>
+              <a:latin typeface="Calibri" panose="020F0502020204030204"/>
+              <a:ea typeface="+mn-ea"/>
+              <a:cs typeface="+mn-cs"/>
+            </a:endParaRPr>
+          </a:p>
+        </p:txBody>
+      </p:sp>
+      <p:sp>
+        <p:nvSpPr>
+          <p:cNvPr id="3" name="Content Placeholder 2">
+            <a:extLst>
+              <a:ext uri="{FF2B5EF4-FFF2-40B4-BE49-F238E27FC236}">
+                <a16:creationId xmlns:a16="http://schemas.microsoft.com/office/drawing/2014/main" id="{C32C0F97-F5CA-642B-1FDB-194D09A47098}"/>
+              </a:ext>
+            </a:extLst>
+          </p:cNvPr>
+          <p:cNvSpPr>
+            <a:spLocks noGrp="1"/>
+          </p:cNvSpPr>
+          <p:nvPr>
+            <p:ph idx="1"/>
+          </p:nvPr>
+        </p:nvSpPr>
+        <p:spPr>
+          <a:xfrm>
+            <a:off x="371094" y="2718054"/>
+            <a:ext cx="3499866" cy="3207258"/>
+          </a:xfrm>
+        </p:spPr>
+        <p:txBody>
+          <a:bodyPr anchor="t">
+            <a:normAutofit/>
+          </a:bodyPr>
+          <a:lstStyle/>
+          <a:p>
+            <a:pPr marL="0" indent="0">
+              <a:buNone/>
+            </a:pPr>
+            <a:r>
+              <a:rPr lang="en-US" sz="1700" dirty="0"/>
+              <a:t>Create an automated script to generate the best GP fit using kernel space exploration and dimensions</a:t>
+            </a:r>
+          </a:p>
+          <a:p>
+            <a:r>
+              <a:rPr lang="en-US" sz="1700" dirty="0"/>
+              <a:t>Loop through different variables: kernels, latent processes, and mean functions</a:t>
+            </a:r>
+          </a:p>
+          <a:p>
+            <a:pPr lvl="1"/>
+            <a:r>
+              <a:rPr lang="en-US" sz="1300" dirty="0"/>
+              <a:t>First, through base kernels, then through combinations (by addition and/or multiplication) of kernels [1-3]</a:t>
+            </a:r>
+          </a:p>
+          <a:p>
+            <a:r>
+              <a:rPr lang="en-US" sz="1700" dirty="0"/>
+              <a:t>Possibly also loop through different likelihoods</a:t>
+            </a:r>
+          </a:p>
+        </p:txBody>
+      </p:sp>
+      <p:pic>
+        <p:nvPicPr>
+          <p:cNvPr id="5" name="Picture 4">
+            <a:extLst>
+              <a:ext uri="{FF2B5EF4-FFF2-40B4-BE49-F238E27FC236}">
+                <a16:creationId xmlns:a16="http://schemas.microsoft.com/office/drawing/2014/main" id="{55D15E42-4285-CB43-03AA-9640D5730ABA}"/>
+              </a:ext>
+            </a:extLst>
+          </p:cNvPr>
+          <p:cNvPicPr>
+            <a:picLocks noChangeAspect="1"/>
+          </p:cNvPicPr>
+          <p:nvPr/>
+        </p:nvPicPr>
+        <p:blipFill>
+          <a:blip r:embed="rId3"/>
+          <a:stretch>
+            <a:fillRect/>
+          </a:stretch>
+        </p:blipFill>
+        <p:spPr>
+          <a:xfrm>
+            <a:off x="4901184" y="1653612"/>
+            <a:ext cx="6922008" cy="3651359"/>
+          </a:xfrm>
+          <a:prstGeom prst="rect">
+            <a:avLst/>
+          </a:prstGeom>
+        </p:spPr>
+      </p:pic>
+      <p:sp>
+        <p:nvSpPr>
+          <p:cNvPr id="6" name="Footer Placeholder 5">
+            <a:extLst>
+              <a:ext uri="{FF2B5EF4-FFF2-40B4-BE49-F238E27FC236}">
+                <a16:creationId xmlns:a16="http://schemas.microsoft.com/office/drawing/2014/main" id="{6C6B4742-1C4A-F035-DEF0-5502F799011D}"/>
+              </a:ext>
+            </a:extLst>
+          </p:cNvPr>
+          <p:cNvSpPr>
+            <a:spLocks noGrp="1"/>
+          </p:cNvSpPr>
+          <p:nvPr>
+            <p:ph type="ftr" sz="quarter" idx="11"/>
+          </p:nvPr>
+        </p:nvSpPr>
+        <p:spPr>
+          <a:xfrm>
+            <a:off x="563880" y="6356350"/>
+            <a:ext cx="10703560" cy="365125"/>
+          </a:xfrm>
+        </p:spPr>
         <p:txBody>
           <a:bodyPr/>
           <a:lstStyle/>
           <a:p>
             <a:r>
               <a:rPr lang="en-US" dirty="0"/>
-              <a:t>Gaussian Processes Script</a:t>
-            </a:r>
-          </a:p>
-        </p:txBody>
-      </p:sp>
-      <p:sp>
-        <p:nvSpPr>
-          <p:cNvPr id="3" name="Content Placeholder 2">
-            <a:extLst>
-              <a:ext uri="{FF2B5EF4-FFF2-40B4-BE49-F238E27FC236}">
-                <a16:creationId xmlns:a16="http://schemas.microsoft.com/office/drawing/2014/main" id="{C32C0F97-F5CA-642B-1FDB-194D09A47098}"/>
-              </a:ext>
-            </a:extLst>
-          </p:cNvPr>
-          <p:cNvSpPr>
-            <a:spLocks noGrp="1"/>
-          </p:cNvSpPr>
-          <p:nvPr>
-            <p:ph idx="1"/>
-          </p:nvPr>
-        </p:nvSpPr>
-        <p:spPr/>
-        <p:txBody>
-          <a:bodyPr/>
-          <a:lstStyle/>
-          <a:p>
+              <a:t>(1) Lloyd, J.; </a:t>
+            </a:r>
+            <a:r>
+              <a:rPr lang="en-US" dirty="0" err="1"/>
+              <a:t>Duvenaud</a:t>
+            </a:r>
             <a:r>
               <a:rPr lang="en-US" dirty="0"/>
-              <a:t>Create an automated script to generate the best GP regression</a:t>
-            </a:r>
-          </a:p>
-          <a:p>
+              <a:t>, D.; Grosse, R.; Tenenbaum, J.; </a:t>
+            </a:r>
+            <a:r>
+              <a:rPr lang="en-US" dirty="0" err="1"/>
+              <a:t>Ghahramani</a:t>
+            </a:r>
             <a:r>
               <a:rPr lang="en-US" dirty="0"/>
-              <a:t>Loop through different variables: kernels, latent processes, etc.</a:t>
+              <a:t>, Z. Automatic Construction and Natural-Language Description of Nonparametric Regression Models. Proceedings of the AAAI Conference on Artificial Intelligence 2014, 28 (1). https://doi.org/10.1609/aaai.v28i1.8904.</a:t>
             </a:r>
           </a:p>
         </p:txBody>
@@ -5227,217 +5903,6 @@
           <p:cNvPr id="2" name="Title 1">
             <a:extLst>
               <a:ext uri="{FF2B5EF4-FFF2-40B4-BE49-F238E27FC236}">
-                <a16:creationId xmlns:a16="http://schemas.microsoft.com/office/drawing/2014/main" id="{98C503EB-58EB-0EDD-F828-71E0EED2EF16}"/>
-              </a:ext>
-            </a:extLst>
-          </p:cNvPr>
-          <p:cNvSpPr>
-            <a:spLocks noGrp="1"/>
-          </p:cNvSpPr>
-          <p:nvPr>
-            <p:ph type="title"/>
-          </p:nvPr>
-        </p:nvSpPr>
-        <p:spPr/>
-        <p:txBody>
-          <a:bodyPr/>
-          <a:lstStyle/>
-          <a:p>
-            <a:r>
-              <a:rPr lang="en-US" dirty="0"/>
-              <a:t>BIC</a:t>
-            </a:r>
-          </a:p>
-        </p:txBody>
-      </p:sp>
-      <p:sp>
-        <p:nvSpPr>
-          <p:cNvPr id="3" name="Content Placeholder 2">
-            <a:extLst>
-              <a:ext uri="{FF2B5EF4-FFF2-40B4-BE49-F238E27FC236}">
-                <a16:creationId xmlns:a16="http://schemas.microsoft.com/office/drawing/2014/main" id="{B67BA8A8-0828-BB9C-9042-D30F230F1363}"/>
-              </a:ext>
-            </a:extLst>
-          </p:cNvPr>
-          <p:cNvSpPr>
-            <a:spLocks noGrp="1"/>
-          </p:cNvSpPr>
-          <p:nvPr>
-            <p:ph idx="1"/>
-          </p:nvPr>
-        </p:nvSpPr>
-        <p:spPr/>
-        <p:txBody>
-          <a:bodyPr/>
-          <a:lstStyle/>
-          <a:p>
-            <a:r>
-              <a:rPr lang="en-US" dirty="0"/>
-              <a:t>Talk about how there are different BIC measurements, and how choosing one or the other changes the best fitted model selection</a:t>
-            </a:r>
-          </a:p>
-        </p:txBody>
-      </p:sp>
-      <p:pic>
-        <p:nvPicPr>
-          <p:cNvPr id="5" name="Picture 4">
-            <a:extLst>
-              <a:ext uri="{FF2B5EF4-FFF2-40B4-BE49-F238E27FC236}">
-                <a16:creationId xmlns:a16="http://schemas.microsoft.com/office/drawing/2014/main" id="{BAF4A962-9BE8-E7AE-A5AF-9361C09E0686}"/>
-              </a:ext>
-            </a:extLst>
-          </p:cNvPr>
-          <p:cNvPicPr>
-            <a:picLocks noChangeAspect="1"/>
-          </p:cNvPicPr>
-          <p:nvPr/>
-        </p:nvPicPr>
-        <p:blipFill>
-          <a:blip r:embed="rId2"/>
-          <a:stretch>
-            <a:fillRect/>
-          </a:stretch>
-        </p:blipFill>
-        <p:spPr>
-          <a:xfrm>
-            <a:off x="759918" y="3613666"/>
-            <a:ext cx="4088484" cy="457240"/>
-          </a:xfrm>
-          <a:prstGeom prst="rect">
-            <a:avLst/>
-          </a:prstGeom>
-        </p:spPr>
-      </p:pic>
-      <p:sp>
-        <p:nvSpPr>
-          <p:cNvPr id="7" name="TextBox 6">
-            <a:extLst>
-              <a:ext uri="{FF2B5EF4-FFF2-40B4-BE49-F238E27FC236}">
-                <a16:creationId xmlns:a16="http://schemas.microsoft.com/office/drawing/2014/main" id="{A856F2CE-8531-46A8-D9A0-BD4D63BC0BF3}"/>
-              </a:ext>
-            </a:extLst>
-          </p:cNvPr>
-          <p:cNvSpPr txBox="1"/>
-          <p:nvPr/>
-        </p:nvSpPr>
-        <p:spPr>
-          <a:xfrm>
-            <a:off x="759918" y="3176866"/>
-            <a:ext cx="949960" cy="369332"/>
-          </a:xfrm>
-          <a:prstGeom prst="rect">
-            <a:avLst/>
-          </a:prstGeom>
-          <a:noFill/>
-        </p:spPr>
-        <p:txBody>
-          <a:bodyPr wrap="square">
-            <a:spAutoFit/>
-          </a:bodyPr>
-          <a:lstStyle/>
-          <a:p>
-            <a:r>
-              <a:rPr lang="en-US" dirty="0"/>
-              <a:t>BIC loss</a:t>
-            </a:r>
-          </a:p>
-        </p:txBody>
-      </p:sp>
-      <p:pic>
-        <p:nvPicPr>
-          <p:cNvPr id="9" name="Picture 8">
-            <a:extLst>
-              <a:ext uri="{FF2B5EF4-FFF2-40B4-BE49-F238E27FC236}">
-                <a16:creationId xmlns:a16="http://schemas.microsoft.com/office/drawing/2014/main" id="{9AACA5BA-E233-EA90-46C3-FC45C43AC675}"/>
-              </a:ext>
-            </a:extLst>
-          </p:cNvPr>
-          <p:cNvPicPr>
-            <a:picLocks noChangeAspect="1"/>
-          </p:cNvPicPr>
-          <p:nvPr/>
-        </p:nvPicPr>
-        <p:blipFill>
-          <a:blip r:embed="rId3"/>
-          <a:stretch>
-            <a:fillRect/>
-          </a:stretch>
-        </p:blipFill>
-        <p:spPr>
-          <a:xfrm>
-            <a:off x="6936194" y="2931446"/>
-            <a:ext cx="3626485" cy="625776"/>
-          </a:xfrm>
-          <a:prstGeom prst="rect">
-            <a:avLst/>
-          </a:prstGeom>
-        </p:spPr>
-      </p:pic>
-      <p:pic>
-        <p:nvPicPr>
-          <p:cNvPr id="11" name="Picture 10">
-            <a:extLst>
-              <a:ext uri="{FF2B5EF4-FFF2-40B4-BE49-F238E27FC236}">
-                <a16:creationId xmlns:a16="http://schemas.microsoft.com/office/drawing/2014/main" id="{A8411C24-FC97-0855-60EF-9DEB1C81F6E3}"/>
-              </a:ext>
-            </a:extLst>
-          </p:cNvPr>
-          <p:cNvPicPr>
-            <a:picLocks noChangeAspect="1"/>
-          </p:cNvPicPr>
-          <p:nvPr/>
-        </p:nvPicPr>
-        <p:blipFill>
-          <a:blip r:embed="rId4"/>
-          <a:stretch>
-            <a:fillRect/>
-          </a:stretch>
-        </p:blipFill>
-        <p:spPr>
-          <a:xfrm>
-            <a:off x="6936194" y="3613666"/>
-            <a:ext cx="3786410" cy="2446940"/>
-          </a:xfrm>
-          <a:prstGeom prst="rect">
-            <a:avLst/>
-          </a:prstGeom>
-        </p:spPr>
-      </p:pic>
-    </p:spTree>
-    <p:extLst>
-      <p:ext uri="{BB962C8B-B14F-4D97-AF65-F5344CB8AC3E}">
-        <p14:creationId xmlns:p14="http://schemas.microsoft.com/office/powerpoint/2010/main" val="4051288071"/>
-      </p:ext>
-    </p:extLst>
-  </p:cSld>
-  <p:clrMapOvr>
-    <a:masterClrMapping/>
-  </p:clrMapOvr>
-</p:sld>
-</file>
-
-<file path=ppt/slides/slide14.xml><?xml version="1.0" encoding="utf-8"?>
-<p:sld xmlns:a="http://schemas.openxmlformats.org/drawingml/2006/main" xmlns:r="http://schemas.openxmlformats.org/officeDocument/2006/relationships" xmlns:p="http://schemas.openxmlformats.org/presentationml/2006/main">
-  <p:cSld>
-    <p:spTree>
-      <p:nvGrpSpPr>
-        <p:cNvPr id="1" name=""/>
-        <p:cNvGrpSpPr/>
-        <p:nvPr/>
-      </p:nvGrpSpPr>
-      <p:grpSpPr>
-        <a:xfrm>
-          <a:off x="0" y="0"/>
-          <a:ext cx="0" cy="0"/>
-          <a:chOff x="0" y="0"/>
-          <a:chExt cx="0" cy="0"/>
-        </a:xfrm>
-      </p:grpSpPr>
-      <p:sp>
-        <p:nvSpPr>
-          <p:cNvPr id="2" name="Title 1">
-            <a:extLst>
-              <a:ext uri="{FF2B5EF4-FFF2-40B4-BE49-F238E27FC236}">
                 <a16:creationId xmlns:a16="http://schemas.microsoft.com/office/drawing/2014/main" id="{AF8F11DD-A7E6-7E32-CC45-B91E980B641C}"/>
               </a:ext>
             </a:extLst>
@@ -5490,7 +5955,7 @@
         </p:blipFill>
         <p:spPr>
           <a:xfrm>
-            <a:off x="7767317" y="0"/>
+            <a:off x="7716517" y="-132080"/>
             <a:ext cx="3743963" cy="2807973"/>
           </a:xfrm>
           <a:prstGeom prst="rect">
@@ -5526,7 +5991,7 @@
         </p:blipFill>
         <p:spPr>
           <a:xfrm>
-            <a:off x="0" y="2794000"/>
+            <a:off x="0" y="2585720"/>
             <a:ext cx="12192000" cy="4064000"/>
           </a:xfrm>
           <a:prstGeom prst="rect">
@@ -5547,8 +6012,688 @@
 </p:sld>
 </file>
 
+<file path=ppt/slides/slide14.xml><?xml version="1.0" encoding="utf-8"?>
+<p:sld xmlns:a="http://schemas.openxmlformats.org/drawingml/2006/main" xmlns:r="http://schemas.openxmlformats.org/officeDocument/2006/relationships" xmlns:p="http://schemas.openxmlformats.org/presentationml/2006/main">
+  <p:cSld>
+    <p:bg>
+      <p:bgPr>
+        <a:solidFill>
+          <a:schemeClr val="bg1"/>
+        </a:solidFill>
+        <a:effectLst/>
+      </p:bgPr>
+    </p:bg>
+    <p:spTree>
+      <p:nvGrpSpPr>
+        <p:cNvPr id="1" name=""/>
+        <p:cNvGrpSpPr/>
+        <p:nvPr/>
+      </p:nvGrpSpPr>
+      <p:grpSpPr>
+        <a:xfrm>
+          <a:off x="0" y="0"/>
+          <a:ext cx="0" cy="0"/>
+          <a:chOff x="0" y="0"/>
+          <a:chExt cx="0" cy="0"/>
+        </a:xfrm>
+      </p:grpSpPr>
+      <p:sp useBgFill="1">
+        <p:nvSpPr>
+          <p:cNvPr id="9" name="Rectangle 8">
+            <a:extLst>
+              <a:ext uri="{FF2B5EF4-FFF2-40B4-BE49-F238E27FC236}">
+                <a16:creationId xmlns:a16="http://schemas.microsoft.com/office/drawing/2014/main" id="{53F29798-D584-4792-9B62-3F5F5C36D619}"/>
+              </a:ext>
+              <a:ext uri="{C183D7F6-B498-43B3-948B-1728B52AA6E4}">
+                <adec:decorative xmlns:adec="http://schemas.microsoft.com/office/drawing/2017/decorative" val="1"/>
+              </a:ext>
+            </a:extLst>
+          </p:cNvPr>
+          <p:cNvSpPr>
+            <a:spLocks noGrp="1" noRot="1" noChangeAspect="1" noMove="1" noResize="1" noEditPoints="1" noAdjustHandles="1" noChangeArrowheads="1" noChangeShapeType="1" noTextEdit="1"/>
+          </p:cNvSpPr>
+          <p:nvPr>
+            <p:extLst>
+              <p:ext uri="{386F3935-93C4-4BCD-93E2-E3B085C9AB24}">
+                <p16:designElem xmlns:p16="http://schemas.microsoft.com/office/powerpoint/2015/main" val="1"/>
+              </p:ext>
+            </p:extLst>
+          </p:nvPr>
+        </p:nvSpPr>
+        <p:spPr>
+          <a:xfrm>
+            <a:off x="0" y="0"/>
+            <a:ext cx="12188952" cy="6858000"/>
+          </a:xfrm>
+          <a:prstGeom prst="rect">
+            <a:avLst/>
+          </a:prstGeom>
+          <a:ln>
+            <a:noFill/>
+          </a:ln>
+        </p:spPr>
+        <p:style>
+          <a:lnRef idx="2">
+            <a:schemeClr val="accent1">
+              <a:shade val="50000"/>
+            </a:schemeClr>
+          </a:lnRef>
+          <a:fillRef idx="1">
+            <a:schemeClr val="accent1"/>
+          </a:fillRef>
+          <a:effectRef idx="0">
+            <a:schemeClr val="accent1"/>
+          </a:effectRef>
+          <a:fontRef idx="minor">
+            <a:schemeClr val="lt1"/>
+          </a:fontRef>
+        </p:style>
+        <p:txBody>
+          <a:bodyPr rtlCol="0" anchor="ctr"/>
+          <a:lstStyle/>
+          <a:p>
+            <a:pPr algn="ctr"/>
+            <a:endParaRPr lang="en-US"/>
+          </a:p>
+        </p:txBody>
+      </p:sp>
+      <p:sp>
+        <p:nvSpPr>
+          <p:cNvPr id="2" name="Title 1">
+            <a:extLst>
+              <a:ext uri="{FF2B5EF4-FFF2-40B4-BE49-F238E27FC236}">
+                <a16:creationId xmlns:a16="http://schemas.microsoft.com/office/drawing/2014/main" id="{171FBA4D-D29C-737E-34FF-3148B924E939}"/>
+              </a:ext>
+            </a:extLst>
+          </p:cNvPr>
+          <p:cNvSpPr>
+            <a:spLocks noGrp="1"/>
+          </p:cNvSpPr>
+          <p:nvPr>
+            <p:ph type="title"/>
+          </p:nvPr>
+        </p:nvSpPr>
+        <p:spPr>
+          <a:xfrm>
+            <a:off x="838200" y="184805"/>
+            <a:ext cx="10515600" cy="1505883"/>
+          </a:xfrm>
+        </p:spPr>
+        <p:txBody>
+          <a:bodyPr anchor="ctr">
+            <a:normAutofit/>
+          </a:bodyPr>
+          <a:lstStyle/>
+          <a:p>
+            <a:r>
+              <a:rPr lang="en-US" sz="3300"/>
+              <a:t>Search for working/recently-updated forks of the many GitHub repositories related to the Automated Statistician. </a:t>
+            </a:r>
+          </a:p>
+        </p:txBody>
+      </p:sp>
+      <p:pic>
+        <p:nvPicPr>
+          <p:cNvPr id="4" name="Picture 3">
+            <a:extLst>
+              <a:ext uri="{FF2B5EF4-FFF2-40B4-BE49-F238E27FC236}">
+                <a16:creationId xmlns:a16="http://schemas.microsoft.com/office/drawing/2014/main" id="{1A2C4056-97A3-2363-F9EA-133EDEFD3F1D}"/>
+              </a:ext>
+            </a:extLst>
+          </p:cNvPr>
+          <p:cNvPicPr>
+            <a:picLocks noChangeAspect="1"/>
+          </p:cNvPicPr>
+          <p:nvPr/>
+        </p:nvPicPr>
+        <p:blipFill>
+          <a:blip r:embed="rId2"/>
+          <a:stretch>
+            <a:fillRect/>
+          </a:stretch>
+        </p:blipFill>
+        <p:spPr>
+          <a:xfrm>
+            <a:off x="838200" y="2270305"/>
+            <a:ext cx="10512547" cy="3600545"/>
+          </a:xfrm>
+          <a:prstGeom prst="rect">
+            <a:avLst/>
+          </a:prstGeom>
+        </p:spPr>
+      </p:pic>
+    </p:spTree>
+    <p:extLst>
+      <p:ext uri="{BB962C8B-B14F-4D97-AF65-F5344CB8AC3E}">
+        <p14:creationId xmlns:p14="http://schemas.microsoft.com/office/powerpoint/2010/main" val="2996165891"/>
+      </p:ext>
+    </p:extLst>
+  </p:cSld>
+  <p:clrMapOvr>
+    <a:masterClrMapping/>
+  </p:clrMapOvr>
+</p:sld>
+</file>
+
 <file path=ppt/slides/slide15.xml><?xml version="1.0" encoding="utf-8"?>
 <p:sld xmlns:a="http://schemas.openxmlformats.org/drawingml/2006/main" xmlns:r="http://schemas.openxmlformats.org/officeDocument/2006/relationships" xmlns:p="http://schemas.openxmlformats.org/presentationml/2006/main">
+  <p:cSld>
+    <p:spTree>
+      <p:nvGrpSpPr>
+        <p:cNvPr id="1" name=""/>
+        <p:cNvGrpSpPr/>
+        <p:nvPr/>
+      </p:nvGrpSpPr>
+      <p:grpSpPr>
+        <a:xfrm>
+          <a:off x="0" y="0"/>
+          <a:ext cx="0" cy="0"/>
+          <a:chOff x="0" y="0"/>
+          <a:chExt cx="0" cy="0"/>
+        </a:xfrm>
+      </p:grpSpPr>
+      <p:sp>
+        <p:nvSpPr>
+          <p:cNvPr id="2" name="Title 1">
+            <a:extLst>
+              <a:ext uri="{FF2B5EF4-FFF2-40B4-BE49-F238E27FC236}">
+                <a16:creationId xmlns:a16="http://schemas.microsoft.com/office/drawing/2014/main" id="{2617A193-7178-73EB-C19E-B1ADDD6EAE4F}"/>
+              </a:ext>
+            </a:extLst>
+          </p:cNvPr>
+          <p:cNvSpPr>
+            <a:spLocks noGrp="1"/>
+          </p:cNvSpPr>
+          <p:nvPr>
+            <p:ph type="title"/>
+          </p:nvPr>
+        </p:nvSpPr>
+        <p:spPr/>
+        <p:txBody>
+          <a:bodyPr>
+            <a:normAutofit/>
+          </a:bodyPr>
+          <a:lstStyle/>
+          <a:p>
+            <a:r>
+              <a:rPr lang="en-US" dirty="0"/>
+              <a:t>Testing different optimization </a:t>
+            </a:r>
+            <a:r>
+              <a:rPr lang="en-US" dirty="0" err="1"/>
+              <a:t>optimization</a:t>
+            </a:r>
+            <a:r>
+              <a:rPr lang="en-US" dirty="0"/>
+              <a:t> packages/algorithms</a:t>
+            </a:r>
+          </a:p>
+        </p:txBody>
+      </p:sp>
+      <p:sp>
+        <p:nvSpPr>
+          <p:cNvPr id="4" name="TextBox 3">
+            <a:extLst>
+              <a:ext uri="{FF2B5EF4-FFF2-40B4-BE49-F238E27FC236}">
+                <a16:creationId xmlns:a16="http://schemas.microsoft.com/office/drawing/2014/main" id="{D6F3A9FC-00C6-1BE2-569D-9DEBAAED829D}"/>
+              </a:ext>
+            </a:extLst>
+          </p:cNvPr>
+          <p:cNvSpPr txBox="1"/>
+          <p:nvPr/>
+        </p:nvSpPr>
+        <p:spPr>
+          <a:xfrm>
+            <a:off x="1234440" y="2690614"/>
+            <a:ext cx="1915160" cy="1754326"/>
+          </a:xfrm>
+          <a:prstGeom prst="rect">
+            <a:avLst/>
+          </a:prstGeom>
+          <a:noFill/>
+        </p:spPr>
+        <p:txBody>
+          <a:bodyPr wrap="square">
+            <a:spAutoFit/>
+          </a:bodyPr>
+          <a:lstStyle/>
+          <a:p>
+            <a:r>
+              <a:rPr lang="en-US" dirty="0" err="1"/>
+              <a:t>Scipy</a:t>
+            </a:r>
+            <a:r>
+              <a:rPr lang="en-US" dirty="0"/>
+              <a:t>* vs. </a:t>
+            </a:r>
+            <a:r>
+              <a:rPr lang="en-US" dirty="0" err="1"/>
+              <a:t>lmfit</a:t>
+            </a:r>
+            <a:endParaRPr lang="en-US" dirty="0"/>
+          </a:p>
+          <a:p>
+            <a:endParaRPr lang="en-US" dirty="0"/>
+          </a:p>
+          <a:p>
+            <a:r>
+              <a:rPr lang="en-US" dirty="0"/>
+              <a:t>*Currently using </a:t>
+            </a:r>
+            <a:r>
+              <a:rPr lang="en-US" dirty="0" err="1"/>
+              <a:t>scipy’s</a:t>
+            </a:r>
+            <a:r>
+              <a:rPr lang="en-US" dirty="0"/>
+              <a:t> minimize optimization using L-BFGS-B method</a:t>
+            </a:r>
+          </a:p>
+        </p:txBody>
+      </p:sp>
+    </p:spTree>
+    <p:extLst>
+      <p:ext uri="{BB962C8B-B14F-4D97-AF65-F5344CB8AC3E}">
+        <p14:creationId xmlns:p14="http://schemas.microsoft.com/office/powerpoint/2010/main" val="640580833"/>
+      </p:ext>
+    </p:extLst>
+  </p:cSld>
+  <p:clrMapOvr>
+    <a:masterClrMapping/>
+  </p:clrMapOvr>
+</p:sld>
+</file>
+
+<file path=ppt/slides/slide16.xml><?xml version="1.0" encoding="utf-8"?>
+<p:sld xmlns:a="http://schemas.openxmlformats.org/drawingml/2006/main" xmlns:r="http://schemas.openxmlformats.org/officeDocument/2006/relationships" xmlns:p="http://schemas.openxmlformats.org/presentationml/2006/main">
+  <p:cSld>
+    <p:spTree>
+      <p:nvGrpSpPr>
+        <p:cNvPr id="1" name=""/>
+        <p:cNvGrpSpPr/>
+        <p:nvPr/>
+      </p:nvGrpSpPr>
+      <p:grpSpPr>
+        <a:xfrm>
+          <a:off x="0" y="0"/>
+          <a:ext cx="0" cy="0"/>
+          <a:chOff x="0" y="0"/>
+          <a:chExt cx="0" cy="0"/>
+        </a:xfrm>
+      </p:grpSpPr>
+      <p:sp>
+        <p:nvSpPr>
+          <p:cNvPr id="2" name="Title 1">
+            <a:extLst>
+              <a:ext uri="{FF2B5EF4-FFF2-40B4-BE49-F238E27FC236}">
+                <a16:creationId xmlns:a16="http://schemas.microsoft.com/office/drawing/2014/main" id="{98C503EB-58EB-0EDD-F828-71E0EED2EF16}"/>
+              </a:ext>
+            </a:extLst>
+          </p:cNvPr>
+          <p:cNvSpPr>
+            <a:spLocks noGrp="1"/>
+          </p:cNvSpPr>
+          <p:nvPr>
+            <p:ph type="title"/>
+          </p:nvPr>
+        </p:nvSpPr>
+        <p:spPr/>
+        <p:txBody>
+          <a:bodyPr/>
+          <a:lstStyle/>
+          <a:p>
+            <a:r>
+              <a:rPr lang="en-US" dirty="0"/>
+              <a:t>Scoring Models (alternative to BIC?) – LML, CLML, or other</a:t>
+            </a:r>
+          </a:p>
+        </p:txBody>
+      </p:sp>
+      <p:pic>
+        <p:nvPicPr>
+          <p:cNvPr id="5" name="Picture 4">
+            <a:extLst>
+              <a:ext uri="{FF2B5EF4-FFF2-40B4-BE49-F238E27FC236}">
+                <a16:creationId xmlns:a16="http://schemas.microsoft.com/office/drawing/2014/main" id="{BAF4A962-9BE8-E7AE-A5AF-9361C09E0686}"/>
+              </a:ext>
+            </a:extLst>
+          </p:cNvPr>
+          <p:cNvPicPr>
+            <a:picLocks noChangeAspect="1"/>
+          </p:cNvPicPr>
+          <p:nvPr/>
+        </p:nvPicPr>
+        <p:blipFill>
+          <a:blip r:embed="rId2"/>
+          <a:stretch>
+            <a:fillRect/>
+          </a:stretch>
+        </p:blipFill>
+        <p:spPr>
+          <a:xfrm>
+            <a:off x="838200" y="2239492"/>
+            <a:ext cx="4088484" cy="457240"/>
+          </a:xfrm>
+          <a:prstGeom prst="rect">
+            <a:avLst/>
+          </a:prstGeom>
+        </p:spPr>
+      </p:pic>
+      <p:sp>
+        <p:nvSpPr>
+          <p:cNvPr id="7" name="TextBox 6">
+            <a:extLst>
+              <a:ext uri="{FF2B5EF4-FFF2-40B4-BE49-F238E27FC236}">
+                <a16:creationId xmlns:a16="http://schemas.microsoft.com/office/drawing/2014/main" id="{A856F2CE-8531-46A8-D9A0-BD4D63BC0BF3}"/>
+              </a:ext>
+            </a:extLst>
+          </p:cNvPr>
+          <p:cNvSpPr txBox="1"/>
+          <p:nvPr/>
+        </p:nvSpPr>
+        <p:spPr>
+          <a:xfrm>
+            <a:off x="873760" y="1889277"/>
+            <a:ext cx="949960" cy="369332"/>
+          </a:xfrm>
+          <a:prstGeom prst="rect">
+            <a:avLst/>
+          </a:prstGeom>
+          <a:noFill/>
+        </p:spPr>
+        <p:txBody>
+          <a:bodyPr wrap="square">
+            <a:spAutoFit/>
+          </a:bodyPr>
+          <a:lstStyle/>
+          <a:p>
+            <a:r>
+              <a:rPr lang="en-US" dirty="0"/>
+              <a:t>BIC loss</a:t>
+            </a:r>
+          </a:p>
+        </p:txBody>
+      </p:sp>
+      <p:pic>
+        <p:nvPicPr>
+          <p:cNvPr id="9" name="Picture 8">
+            <a:extLst>
+              <a:ext uri="{FF2B5EF4-FFF2-40B4-BE49-F238E27FC236}">
+                <a16:creationId xmlns:a16="http://schemas.microsoft.com/office/drawing/2014/main" id="{9AACA5BA-E233-EA90-46C3-FC45C43AC675}"/>
+              </a:ext>
+            </a:extLst>
+          </p:cNvPr>
+          <p:cNvPicPr>
+            <a:picLocks noChangeAspect="1"/>
+          </p:cNvPicPr>
+          <p:nvPr/>
+        </p:nvPicPr>
+        <p:blipFill>
+          <a:blip r:embed="rId3"/>
+          <a:stretch>
+            <a:fillRect/>
+          </a:stretch>
+        </p:blipFill>
+        <p:spPr>
+          <a:xfrm>
+            <a:off x="923556" y="2992970"/>
+            <a:ext cx="3626485" cy="625776"/>
+          </a:xfrm>
+          <a:prstGeom prst="rect">
+            <a:avLst/>
+          </a:prstGeom>
+        </p:spPr>
+      </p:pic>
+      <p:pic>
+        <p:nvPicPr>
+          <p:cNvPr id="11" name="Picture 10">
+            <a:extLst>
+              <a:ext uri="{FF2B5EF4-FFF2-40B4-BE49-F238E27FC236}">
+                <a16:creationId xmlns:a16="http://schemas.microsoft.com/office/drawing/2014/main" id="{A8411C24-FC97-0855-60EF-9DEB1C81F6E3}"/>
+              </a:ext>
+            </a:extLst>
+          </p:cNvPr>
+          <p:cNvPicPr>
+            <a:picLocks noChangeAspect="1"/>
+          </p:cNvPicPr>
+          <p:nvPr/>
+        </p:nvPicPr>
+        <p:blipFill>
+          <a:blip r:embed="rId4"/>
+          <a:stretch>
+            <a:fillRect/>
+          </a:stretch>
+        </p:blipFill>
+        <p:spPr>
+          <a:xfrm>
+            <a:off x="923556" y="3618746"/>
+            <a:ext cx="3786410" cy="2446940"/>
+          </a:xfrm>
+          <a:prstGeom prst="rect">
+            <a:avLst/>
+          </a:prstGeom>
+        </p:spPr>
+      </p:pic>
+      <p:sp>
+        <p:nvSpPr>
+          <p:cNvPr id="13" name="TextBox 12">
+            <a:extLst>
+              <a:ext uri="{FF2B5EF4-FFF2-40B4-BE49-F238E27FC236}">
+                <a16:creationId xmlns:a16="http://schemas.microsoft.com/office/drawing/2014/main" id="{D86A395D-1C40-D694-DBB3-9DBF5741BA01}"/>
+              </a:ext>
+            </a:extLst>
+          </p:cNvPr>
+          <p:cNvSpPr txBox="1"/>
+          <p:nvPr/>
+        </p:nvSpPr>
+        <p:spPr>
+          <a:xfrm>
+            <a:off x="5786120" y="4994616"/>
+            <a:ext cx="5328920" cy="954107"/>
+          </a:xfrm>
+          <a:prstGeom prst="rect">
+            <a:avLst/>
+          </a:prstGeom>
+          <a:noFill/>
+        </p:spPr>
+        <p:txBody>
+          <a:bodyPr wrap="square">
+            <a:spAutoFit/>
+          </a:bodyPr>
+          <a:lstStyle/>
+          <a:p>
+            <a:r>
+              <a:rPr lang="en-US" sz="1400" dirty="0"/>
+              <a:t>[1] </a:t>
+            </a:r>
+            <a:r>
+              <a:rPr lang="en-US" sz="1400" dirty="0" err="1"/>
+              <a:t>Lotfi</a:t>
+            </a:r>
+            <a:r>
+              <a:rPr lang="en-US" sz="1400" dirty="0"/>
+              <a:t>, S.; </a:t>
+            </a:r>
+            <a:r>
+              <a:rPr lang="en-US" sz="1400" dirty="0" err="1"/>
+              <a:t>Izmailov</a:t>
+            </a:r>
+            <a:r>
+              <a:rPr lang="en-US" sz="1400" dirty="0"/>
+              <a:t>, P.; Benton, G.; Goldblum, M.; Wilson, A. G. Bayesian Model Selection, the Marginal Likelihood, and Generalization. In Proceedings of the 39th International Conference on Machine Learning; PMLR, 2022; pp 14223–14247.</a:t>
+            </a:r>
+          </a:p>
+        </p:txBody>
+      </p:sp>
+      <p:sp>
+        <p:nvSpPr>
+          <p:cNvPr id="15" name="TextBox 14">
+            <a:extLst>
+              <a:ext uri="{FF2B5EF4-FFF2-40B4-BE49-F238E27FC236}">
+                <a16:creationId xmlns:a16="http://schemas.microsoft.com/office/drawing/2014/main" id="{AE03EF31-C2F5-69C8-2278-A06A0E104BC4}"/>
+              </a:ext>
+            </a:extLst>
+          </p:cNvPr>
+          <p:cNvSpPr txBox="1"/>
+          <p:nvPr/>
+        </p:nvSpPr>
+        <p:spPr>
+          <a:xfrm>
+            <a:off x="5786120" y="2073943"/>
+            <a:ext cx="5567680" cy="2585323"/>
+          </a:xfrm>
+          <a:prstGeom prst="rect">
+            <a:avLst/>
+          </a:prstGeom>
+          <a:noFill/>
+        </p:spPr>
+        <p:txBody>
+          <a:bodyPr wrap="square">
+            <a:spAutoFit/>
+          </a:bodyPr>
+          <a:lstStyle/>
+          <a:p>
+            <a:r>
+              <a:rPr lang="en-US" dirty="0"/>
+              <a:t>Conditional LML: namely, we show how marginal likelihood can be negatively correlated with generalization, with implications for neural architecture search, and can lead to both underfitting and overfitting in hyperparameter learning. We provide a partial remedy through a conditional marginal likelihood, which we show is more aligned with generalization, and practically valuable for large-scale hyperparameter learning, such as in deep kernel learning. [1]</a:t>
+            </a:r>
+          </a:p>
+        </p:txBody>
+      </p:sp>
+      <p:cxnSp>
+        <p:nvCxnSpPr>
+          <p:cNvPr id="17" name="Straight Connector 16">
+            <a:extLst>
+              <a:ext uri="{FF2B5EF4-FFF2-40B4-BE49-F238E27FC236}">
+                <a16:creationId xmlns:a16="http://schemas.microsoft.com/office/drawing/2014/main" id="{4C217DBB-CD01-498C-4784-85F28224BD15}"/>
+              </a:ext>
+            </a:extLst>
+          </p:cNvPr>
+          <p:cNvCxnSpPr/>
+          <p:nvPr/>
+        </p:nvCxnSpPr>
+        <p:spPr>
+          <a:xfrm>
+            <a:off x="5313680" y="1889277"/>
+            <a:ext cx="0" cy="4303243"/>
+          </a:xfrm>
+          <a:prstGeom prst="line">
+            <a:avLst/>
+          </a:prstGeom>
+        </p:spPr>
+        <p:style>
+          <a:lnRef idx="1">
+            <a:schemeClr val="accent1"/>
+          </a:lnRef>
+          <a:fillRef idx="0">
+            <a:schemeClr val="accent1"/>
+          </a:fillRef>
+          <a:effectRef idx="0">
+            <a:schemeClr val="accent1"/>
+          </a:effectRef>
+          <a:fontRef idx="minor">
+            <a:schemeClr val="tx1"/>
+          </a:fontRef>
+        </p:style>
+      </p:cxnSp>
+    </p:spTree>
+    <p:extLst>
+      <p:ext uri="{BB962C8B-B14F-4D97-AF65-F5344CB8AC3E}">
+        <p14:creationId xmlns:p14="http://schemas.microsoft.com/office/powerpoint/2010/main" val="4051288071"/>
+      </p:ext>
+    </p:extLst>
+  </p:cSld>
+  <p:clrMapOvr>
+    <a:masterClrMapping/>
+  </p:clrMapOvr>
+</p:sld>
+</file>
+
+<file path=ppt/slides/slide17.xml><?xml version="1.0" encoding="utf-8"?>
+<p:sld xmlns:a="http://schemas.openxmlformats.org/drawingml/2006/main" xmlns:r="http://schemas.openxmlformats.org/officeDocument/2006/relationships" xmlns:p="http://schemas.openxmlformats.org/presentationml/2006/main">
+  <p:cSld>
+    <p:spTree>
+      <p:nvGrpSpPr>
+        <p:cNvPr id="1" name=""/>
+        <p:cNvGrpSpPr/>
+        <p:nvPr/>
+      </p:nvGrpSpPr>
+      <p:grpSpPr>
+        <a:xfrm>
+          <a:off x="0" y="0"/>
+          <a:ext cx="0" cy="0"/>
+          <a:chOff x="0" y="0"/>
+          <a:chExt cx="0" cy="0"/>
+        </a:xfrm>
+      </p:grpSpPr>
+      <p:sp>
+        <p:nvSpPr>
+          <p:cNvPr id="2" name="Title 1">
+            <a:extLst>
+              <a:ext uri="{FF2B5EF4-FFF2-40B4-BE49-F238E27FC236}">
+                <a16:creationId xmlns:a16="http://schemas.microsoft.com/office/drawing/2014/main" id="{2D2040CF-894B-8C86-07DD-F7306E96FB71}"/>
+              </a:ext>
+            </a:extLst>
+          </p:cNvPr>
+          <p:cNvSpPr>
+            <a:spLocks noGrp="1"/>
+          </p:cNvSpPr>
+          <p:nvPr>
+            <p:ph type="title"/>
+          </p:nvPr>
+        </p:nvSpPr>
+        <p:spPr/>
+        <p:txBody>
+          <a:bodyPr/>
+          <a:lstStyle/>
+          <a:p>
+            <a:r>
+              <a:rPr lang="en-US" dirty="0"/>
+              <a:t>System learning?</a:t>
+            </a:r>
+          </a:p>
+        </p:txBody>
+      </p:sp>
+      <p:sp>
+        <p:nvSpPr>
+          <p:cNvPr id="3" name="Content Placeholder 2">
+            <a:extLst>
+              <a:ext uri="{FF2B5EF4-FFF2-40B4-BE49-F238E27FC236}">
+                <a16:creationId xmlns:a16="http://schemas.microsoft.com/office/drawing/2014/main" id="{2B5E595A-1695-BAA5-CA1A-ED3976F79989}"/>
+              </a:ext>
+            </a:extLst>
+          </p:cNvPr>
+          <p:cNvSpPr>
+            <a:spLocks noGrp="1"/>
+          </p:cNvSpPr>
+          <p:nvPr>
+            <p:ph idx="1"/>
+          </p:nvPr>
+        </p:nvSpPr>
+        <p:spPr/>
+        <p:txBody>
+          <a:bodyPr/>
+          <a:lstStyle/>
+          <a:p>
+            <a:endParaRPr lang="en-US"/>
+          </a:p>
+        </p:txBody>
+      </p:sp>
+    </p:spTree>
+    <p:extLst>
+      <p:ext uri="{BB962C8B-B14F-4D97-AF65-F5344CB8AC3E}">
+        <p14:creationId xmlns:p14="http://schemas.microsoft.com/office/powerpoint/2010/main" val="724814946"/>
+      </p:ext>
+    </p:extLst>
+  </p:cSld>
+  <p:clrMapOvr>
+    <a:masterClrMapping/>
+  </p:clrMapOvr>
+</p:sld>
+</file>
+
+<file path=ppt/slides/slide18.xml><?xml version="1.0" encoding="utf-8"?>
+<p:sld xmlns:a="http://schemas.openxmlformats.org/drawingml/2006/main" xmlns:r="http://schemas.openxmlformats.org/officeDocument/2006/relationships" xmlns:p="http://schemas.openxmlformats.org/presentationml/2006/main" show="0">
   <p:cSld>
     <p:bg>
       <p:bgPr>

</xml_diff>

<commit_message>
Added VGP fittings for independent species
</commit_message>
<xml_diff>
--- a/GPRCommunities.pptx
+++ b/GPRCommunities.pptx
@@ -5,7 +5,7 @@
     <p:sldMasterId id="2147483648" r:id="rId1"/>
   </p:sldMasterIdLst>
   <p:notesMasterIdLst>
-    <p:notesMasterId r:id="rId24"/>
+    <p:notesMasterId r:id="rId23"/>
   </p:notesMasterIdLst>
   <p:sldIdLst>
     <p:sldId id="256" r:id="rId2"/>
@@ -27,9 +27,8 @@
     <p:sldId id="259" r:id="rId18"/>
     <p:sldId id="1093" r:id="rId19"/>
     <p:sldId id="1094" r:id="rId20"/>
-    <p:sldId id="276" r:id="rId21"/>
-    <p:sldId id="277" r:id="rId22"/>
-    <p:sldId id="278" r:id="rId23"/>
+    <p:sldId id="277" r:id="rId21"/>
+    <p:sldId id="278" r:id="rId22"/>
   </p:sldIdLst>
   <p:sldSz cx="12192000" cy="6858000"/>
   <p:notesSz cx="6858000" cy="9144000"/>
@@ -2783,7 +2782,7 @@
           <a:p>
             <a:fld id="{C6C72B9D-EF0C-4E16-A6A8-6793C8460034}" type="datetimeFigureOut">
               <a:rPr lang="en-US" smtClean="0"/>
-              <a:t>8/22/2023</a:t>
+              <a:t>8/24/2023</a:t>
             </a:fld>
             <a:endParaRPr lang="en-US"/>
           </a:p>
@@ -4527,7 +4526,7 @@
           <a:p>
             <a:fld id="{58D99F9D-2103-4E0F-8EC4-FC1F4C4457DE}" type="datetimeFigureOut">
               <a:rPr lang="en-US" smtClean="0"/>
-              <a:t>8/22/2023</a:t>
+              <a:t>8/24/2023</a:t>
             </a:fld>
             <a:endParaRPr lang="en-US"/>
           </a:p>
@@ -4737,7 +4736,7 @@
           <a:p>
             <a:fld id="{58D99F9D-2103-4E0F-8EC4-FC1F4C4457DE}" type="datetimeFigureOut">
               <a:rPr lang="en-US" smtClean="0"/>
-              <a:t>8/22/2023</a:t>
+              <a:t>8/24/2023</a:t>
             </a:fld>
             <a:endParaRPr lang="en-US"/>
           </a:p>
@@ -4957,7 +4956,7 @@
           <a:p>
             <a:fld id="{58D99F9D-2103-4E0F-8EC4-FC1F4C4457DE}" type="datetimeFigureOut">
               <a:rPr lang="en-US" smtClean="0"/>
-              <a:t>8/22/2023</a:t>
+              <a:t>8/24/2023</a:t>
             </a:fld>
             <a:endParaRPr lang="en-US"/>
           </a:p>
@@ -5351,7 +5350,7 @@
           <a:p>
             <a:fld id="{58D99F9D-2103-4E0F-8EC4-FC1F4C4457DE}" type="datetimeFigureOut">
               <a:rPr lang="en-US" smtClean="0"/>
-              <a:t>8/22/2023</a:t>
+              <a:t>8/24/2023</a:t>
             </a:fld>
             <a:endParaRPr lang="en-US"/>
           </a:p>
@@ -5638,7 +5637,7 @@
           <a:p>
             <a:fld id="{58D99F9D-2103-4E0F-8EC4-FC1F4C4457DE}" type="datetimeFigureOut">
               <a:rPr lang="en-US" smtClean="0"/>
-              <a:t>8/22/2023</a:t>
+              <a:t>8/24/2023</a:t>
             </a:fld>
             <a:endParaRPr lang="en-US"/>
           </a:p>
@@ -5915,7 +5914,7 @@
           <a:p>
             <a:fld id="{58D99F9D-2103-4E0F-8EC4-FC1F4C4457DE}" type="datetimeFigureOut">
               <a:rPr lang="en-US" smtClean="0"/>
-              <a:t>8/22/2023</a:t>
+              <a:t>8/24/2023</a:t>
             </a:fld>
             <a:endParaRPr lang="en-US"/>
           </a:p>
@@ -6339,7 +6338,7 @@
           <a:p>
             <a:fld id="{58D99F9D-2103-4E0F-8EC4-FC1F4C4457DE}" type="datetimeFigureOut">
               <a:rPr lang="en-US" smtClean="0"/>
-              <a:t>8/22/2023</a:t>
+              <a:t>8/24/2023</a:t>
             </a:fld>
             <a:endParaRPr lang="en-US"/>
           </a:p>
@@ -6492,7 +6491,7 @@
           <a:p>
             <a:fld id="{58D99F9D-2103-4E0F-8EC4-FC1F4C4457DE}" type="datetimeFigureOut">
               <a:rPr lang="en-US" smtClean="0"/>
-              <a:t>8/22/2023</a:t>
+              <a:t>8/24/2023</a:t>
             </a:fld>
             <a:endParaRPr lang="en-US"/>
           </a:p>
@@ -6617,7 +6616,7 @@
           <a:p>
             <a:fld id="{58D99F9D-2103-4E0F-8EC4-FC1F4C4457DE}" type="datetimeFigureOut">
               <a:rPr lang="en-US" smtClean="0"/>
-              <a:t>8/22/2023</a:t>
+              <a:t>8/24/2023</a:t>
             </a:fld>
             <a:endParaRPr lang="en-US"/>
           </a:p>
@@ -6940,7 +6939,7 @@
           <a:p>
             <a:fld id="{58D99F9D-2103-4E0F-8EC4-FC1F4C4457DE}" type="datetimeFigureOut">
               <a:rPr lang="en-US" smtClean="0"/>
-              <a:t>8/22/2023</a:t>
+              <a:t>8/24/2023</a:t>
             </a:fld>
             <a:endParaRPr lang="en-US"/>
           </a:p>
@@ -7240,7 +7239,7 @@
           <a:p>
             <a:fld id="{58D99F9D-2103-4E0F-8EC4-FC1F4C4457DE}" type="datetimeFigureOut">
               <a:rPr lang="en-US" smtClean="0"/>
-              <a:t>8/22/2023</a:t>
+              <a:t>8/24/2023</a:t>
             </a:fld>
             <a:endParaRPr lang="en-US"/>
           </a:p>
@@ -7493,7 +7492,7 @@
           <a:p>
             <a:fld id="{58D99F9D-2103-4E0F-8EC4-FC1F4C4457DE}" type="datetimeFigureOut">
               <a:rPr lang="en-US" smtClean="0"/>
-              <a:t>8/22/2023</a:t>
+              <a:t>8/24/2023</a:t>
             </a:fld>
             <a:endParaRPr lang="en-US"/>
           </a:p>
@@ -10712,588 +10711,6 @@
       </p:grpSpPr>
       <p:sp useBgFill="1">
         <p:nvSpPr>
-          <p:cNvPr id="17" name="Rectangle 16">
-            <a:extLst>
-              <a:ext uri="{FF2B5EF4-FFF2-40B4-BE49-F238E27FC236}">
-                <a16:creationId xmlns:a16="http://schemas.microsoft.com/office/drawing/2014/main" id="{955A2079-FA98-4876-80F0-72364A7D2EA4}"/>
-              </a:ext>
-              <a:ext uri="{C183D7F6-B498-43B3-948B-1728B52AA6E4}">
-                <adec:decorative xmlns:adec="http://schemas.microsoft.com/office/drawing/2017/decorative" val="1"/>
-              </a:ext>
-            </a:extLst>
-          </p:cNvPr>
-          <p:cNvSpPr>
-            <a:spLocks noGrp="1" noRot="1" noChangeAspect="1" noMove="1" noResize="1" noEditPoints="1" noAdjustHandles="1" noChangeArrowheads="1" noChangeShapeType="1" noTextEdit="1"/>
-          </p:cNvSpPr>
-          <p:nvPr>
-            <p:extLst>
-              <p:ext uri="{386F3935-93C4-4BCD-93E2-E3B085C9AB24}">
-                <p16:designElem xmlns:p16="http://schemas.microsoft.com/office/powerpoint/2015/main" val="1"/>
-              </p:ext>
-            </p:extLst>
-          </p:nvPr>
-        </p:nvSpPr>
-        <p:spPr>
-          <a:xfrm>
-            <a:off x="-1" y="0"/>
-            <a:ext cx="12188952" cy="6858000"/>
-          </a:xfrm>
-          <a:prstGeom prst="rect">
-            <a:avLst/>
-          </a:prstGeom>
-          <a:ln>
-            <a:noFill/>
-          </a:ln>
-        </p:spPr>
-        <p:style>
-          <a:lnRef idx="2">
-            <a:schemeClr val="accent1">
-              <a:shade val="50000"/>
-            </a:schemeClr>
-          </a:lnRef>
-          <a:fillRef idx="1">
-            <a:schemeClr val="accent1"/>
-          </a:fillRef>
-          <a:effectRef idx="0">
-            <a:schemeClr val="accent1"/>
-          </a:effectRef>
-          <a:fontRef idx="minor">
-            <a:schemeClr val="lt1"/>
-          </a:fontRef>
-        </p:style>
-        <p:txBody>
-          <a:bodyPr rtlCol="0" anchor="ctr"/>
-          <a:lstStyle/>
-          <a:p>
-            <a:pPr algn="ctr"/>
-            <a:endParaRPr lang="en-US"/>
-          </a:p>
-        </p:txBody>
-      </p:sp>
-      <p:sp>
-        <p:nvSpPr>
-          <p:cNvPr id="2" name="Title 1">
-            <a:extLst>
-              <a:ext uri="{FF2B5EF4-FFF2-40B4-BE49-F238E27FC236}">
-                <a16:creationId xmlns:a16="http://schemas.microsoft.com/office/drawing/2014/main" id="{2617A193-7178-73EB-C19E-B1ADDD6EAE4F}"/>
-              </a:ext>
-            </a:extLst>
-          </p:cNvPr>
-          <p:cNvSpPr>
-            <a:spLocks noGrp="1"/>
-          </p:cNvSpPr>
-          <p:nvPr>
-            <p:ph type="title"/>
-          </p:nvPr>
-        </p:nvSpPr>
-        <p:spPr>
-          <a:xfrm>
-            <a:off x="838200" y="557188"/>
-            <a:ext cx="10515600" cy="1133499"/>
-          </a:xfrm>
-        </p:spPr>
-        <p:txBody>
-          <a:bodyPr vert="horz" lIns="91440" tIns="45720" rIns="91440" bIns="45720" rtlCol="0" anchor="ctr">
-            <a:normAutofit/>
-          </a:bodyPr>
-          <a:lstStyle/>
-          <a:p>
-            <a:pPr algn="ctr"/>
-            <a:r>
-              <a:rPr lang="en-US" sz="5200" kern="1200">
-                <a:solidFill>
-                  <a:schemeClr val="tx1"/>
-                </a:solidFill>
-                <a:latin typeface="+mj-lt"/>
-                <a:ea typeface="+mj-ea"/>
-                <a:cs typeface="+mj-cs"/>
-              </a:rPr>
-              <a:t>Other Questions</a:t>
-            </a:r>
-          </a:p>
-        </p:txBody>
-      </p:sp>
-      <p:sp>
-        <p:nvSpPr>
-          <p:cNvPr id="4" name="TextBox 3">
-            <a:extLst>
-              <a:ext uri="{FF2B5EF4-FFF2-40B4-BE49-F238E27FC236}">
-                <a16:creationId xmlns:a16="http://schemas.microsoft.com/office/drawing/2014/main" id="{D6F3A9FC-00C6-1BE2-569D-9DEBAAED829D}"/>
-              </a:ext>
-            </a:extLst>
-          </p:cNvPr>
-          <p:cNvSpPr txBox="1"/>
-          <p:nvPr/>
-        </p:nvSpPr>
-        <p:spPr>
-          <a:xfrm>
-            <a:off x="1093210" y="4310465"/>
-            <a:ext cx="3848079" cy="1583767"/>
-          </a:xfrm>
-          <a:prstGeom prst="rect">
-            <a:avLst/>
-          </a:prstGeom>
-          <a:noFill/>
-        </p:spPr>
-        <p:txBody>
-          <a:bodyPr wrap="square">
-            <a:spAutoFit/>
-          </a:bodyPr>
-          <a:lstStyle/>
-          <a:p>
-            <a:pPr defTabSz="969264">
-              <a:spcAft>
-                <a:spcPts val="600"/>
-              </a:spcAft>
-            </a:pPr>
-            <a:r>
-              <a:rPr lang="en-US" sz="2968" kern="1200" err="1">
-                <a:solidFill>
-                  <a:schemeClr val="tx1"/>
-                </a:solidFill>
-                <a:latin typeface="+mn-lt"/>
-                <a:ea typeface="+mn-ea"/>
-                <a:cs typeface="+mn-cs"/>
-              </a:rPr>
-              <a:t>Scipy</a:t>
-            </a:r>
-            <a:r>
-              <a:rPr lang="en-US" sz="2968" kern="1200">
-                <a:solidFill>
-                  <a:schemeClr val="tx1"/>
-                </a:solidFill>
-                <a:latin typeface="+mn-lt"/>
-                <a:ea typeface="+mn-ea"/>
-                <a:cs typeface="+mn-cs"/>
-              </a:rPr>
-              <a:t>* vs. </a:t>
-            </a:r>
-            <a:r>
-              <a:rPr lang="en-US" sz="2968" kern="1200" err="1">
-                <a:solidFill>
-                  <a:schemeClr val="tx1"/>
-                </a:solidFill>
-                <a:latin typeface="+mn-lt"/>
-                <a:ea typeface="+mn-ea"/>
-                <a:cs typeface="+mn-cs"/>
-              </a:rPr>
-              <a:t>lmfit</a:t>
-            </a:r>
-            <a:endParaRPr lang="en-US" sz="2968" kern="1200">
-              <a:solidFill>
-                <a:schemeClr val="tx1"/>
-              </a:solidFill>
-              <a:latin typeface="+mn-lt"/>
-              <a:ea typeface="+mn-ea"/>
-              <a:cs typeface="+mn-cs"/>
-            </a:endParaRPr>
-          </a:p>
-          <a:p>
-            <a:pPr defTabSz="969264">
-              <a:spcAft>
-                <a:spcPts val="600"/>
-              </a:spcAft>
-            </a:pPr>
-            <a:endParaRPr lang="en-US" sz="1908" kern="1200">
-              <a:solidFill>
-                <a:schemeClr val="tx1"/>
-              </a:solidFill>
-              <a:latin typeface="+mn-lt"/>
-              <a:ea typeface="+mn-ea"/>
-              <a:cs typeface="+mn-cs"/>
-            </a:endParaRPr>
-          </a:p>
-          <a:p>
-            <a:pPr defTabSz="969264">
-              <a:spcAft>
-                <a:spcPts val="600"/>
-              </a:spcAft>
-            </a:pPr>
-            <a:r>
-              <a:rPr lang="en-US" sz="1908" kern="1200">
-                <a:solidFill>
-                  <a:schemeClr val="tx1"/>
-                </a:solidFill>
-                <a:latin typeface="+mn-lt"/>
-                <a:ea typeface="+mn-ea"/>
-                <a:cs typeface="+mn-cs"/>
-              </a:rPr>
-              <a:t>*Currently using </a:t>
-            </a:r>
-            <a:r>
-              <a:rPr lang="en-US" sz="1908" kern="1200" err="1">
-                <a:solidFill>
-                  <a:schemeClr val="tx1"/>
-                </a:solidFill>
-                <a:latin typeface="+mn-lt"/>
-                <a:ea typeface="+mn-ea"/>
-                <a:cs typeface="+mn-cs"/>
-              </a:rPr>
-              <a:t>scipy’s</a:t>
-            </a:r>
-            <a:r>
-              <a:rPr lang="en-US" sz="1908" kern="1200">
-                <a:solidFill>
-                  <a:schemeClr val="tx1"/>
-                </a:solidFill>
-                <a:latin typeface="+mn-lt"/>
-                <a:ea typeface="+mn-ea"/>
-                <a:cs typeface="+mn-cs"/>
-              </a:rPr>
-              <a:t> minimize optimization using L-BFGS-B method</a:t>
-            </a:r>
-            <a:endParaRPr lang="en-US"/>
-          </a:p>
-        </p:txBody>
-      </p:sp>
-      <p:sp>
-        <p:nvSpPr>
-          <p:cNvPr id="3" name="Title 1">
-            <a:extLst>
-              <a:ext uri="{FF2B5EF4-FFF2-40B4-BE49-F238E27FC236}">
-                <a16:creationId xmlns:a16="http://schemas.microsoft.com/office/drawing/2014/main" id="{80D1F6D3-B57C-2852-E06F-C6532DB5225B}"/>
-              </a:ext>
-            </a:extLst>
-          </p:cNvPr>
-          <p:cNvSpPr txBox="1">
-            <a:spLocks/>
-          </p:cNvSpPr>
-          <p:nvPr/>
-        </p:nvSpPr>
-        <p:spPr>
-          <a:xfrm>
-            <a:off x="6762705" y="2617786"/>
-            <a:ext cx="4531928" cy="1622428"/>
-          </a:xfrm>
-          <a:prstGeom prst="rect">
-            <a:avLst/>
-          </a:prstGeom>
-        </p:spPr>
-        <p:txBody>
-          <a:bodyPr vert="horz" lIns="91440" tIns="45720" rIns="91440" bIns="45720" rtlCol="0" anchor="ctr">
-            <a:normAutofit/>
-          </a:bodyPr>
-          <a:lstStyle>
-            <a:lvl1pPr algn="l" defTabSz="914400" rtl="0" eaLnBrk="1" latinLnBrk="0" hangingPunct="1">
-              <a:lnSpc>
-                <a:spcPct val="90000"/>
-              </a:lnSpc>
-              <a:spcBef>
-                <a:spcPct val="0"/>
-              </a:spcBef>
-              <a:buNone/>
-              <a:defRPr sz="4400" kern="1200">
-                <a:solidFill>
-                  <a:schemeClr val="tx1"/>
-                </a:solidFill>
-                <a:latin typeface="+mj-lt"/>
-                <a:ea typeface="+mj-ea"/>
-                <a:cs typeface="+mj-cs"/>
-              </a:defRPr>
-            </a:lvl1pPr>
-          </a:lstStyle>
-          <a:p>
-            <a:pPr defTabSz="969264">
-              <a:spcAft>
-                <a:spcPts val="600"/>
-              </a:spcAft>
-            </a:pPr>
-            <a:r>
-              <a:rPr lang="en-US" sz="2800" kern="1200" dirty="0">
-                <a:solidFill>
-                  <a:schemeClr val="tx1"/>
-                </a:solidFill>
-                <a:latin typeface="+mn-lt"/>
-                <a:ea typeface="+mj-ea"/>
-                <a:cs typeface="+mj-cs"/>
-              </a:rPr>
-              <a:t>Likelihoods</a:t>
-            </a:r>
-            <a:endParaRPr lang="en-US" sz="2800" dirty="0">
-              <a:latin typeface="+mn-lt"/>
-            </a:endParaRPr>
-          </a:p>
-        </p:txBody>
-      </p:sp>
-      <p:sp>
-        <p:nvSpPr>
-          <p:cNvPr id="8" name="TextBox 7">
-            <a:extLst>
-              <a:ext uri="{FF2B5EF4-FFF2-40B4-BE49-F238E27FC236}">
-                <a16:creationId xmlns:a16="http://schemas.microsoft.com/office/drawing/2014/main" id="{68606E23-38DE-8241-B244-206FDE28A128}"/>
-              </a:ext>
-            </a:extLst>
-          </p:cNvPr>
-          <p:cNvSpPr txBox="1"/>
-          <p:nvPr/>
-        </p:nvSpPr>
-        <p:spPr>
-          <a:xfrm>
-            <a:off x="6555876" y="4190421"/>
-            <a:ext cx="3995641" cy="756489"/>
-          </a:xfrm>
-          <a:prstGeom prst="rect">
-            <a:avLst/>
-          </a:prstGeom>
-          <a:noFill/>
-        </p:spPr>
-        <p:txBody>
-          <a:bodyPr wrap="square">
-            <a:spAutoFit/>
-          </a:bodyPr>
-          <a:lstStyle/>
-          <a:p>
-            <a:pPr defTabSz="969264">
-              <a:spcAft>
-                <a:spcPts val="600"/>
-              </a:spcAft>
-            </a:pPr>
-            <a:r>
-              <a:rPr lang="en-US" sz="1908" kern="1200" err="1">
-                <a:solidFill>
-                  <a:srgbClr val="E5C07B"/>
-                </a:solidFill>
-                <a:latin typeface="Consolas" panose="020B0609020204030204" pitchFamily="49" charset="0"/>
-                <a:ea typeface="+mn-ea"/>
-                <a:cs typeface="+mn-cs"/>
-              </a:rPr>
-              <a:t>gpf</a:t>
-            </a:r>
-            <a:r>
-              <a:rPr lang="en-US" sz="1908" kern="1200" err="1">
-                <a:solidFill>
-                  <a:srgbClr val="ABB2BF"/>
-                </a:solidFill>
-                <a:latin typeface="Consolas" panose="020B0609020204030204" pitchFamily="49" charset="0"/>
-                <a:ea typeface="+mn-ea"/>
-                <a:cs typeface="+mn-cs"/>
-              </a:rPr>
-              <a:t>.</a:t>
-            </a:r>
-            <a:r>
-              <a:rPr lang="en-US" sz="1908" kern="1200" err="1">
-                <a:solidFill>
-                  <a:srgbClr val="E5C07B"/>
-                </a:solidFill>
-                <a:latin typeface="Consolas" panose="020B0609020204030204" pitchFamily="49" charset="0"/>
-                <a:ea typeface="+mn-ea"/>
-                <a:cs typeface="+mn-cs"/>
-              </a:rPr>
-              <a:t>likelihoods</a:t>
-            </a:r>
-            <a:r>
-              <a:rPr lang="en-US" sz="1908" kern="1200" err="1">
-                <a:solidFill>
-                  <a:srgbClr val="ABB2BF"/>
-                </a:solidFill>
-                <a:latin typeface="Consolas" panose="020B0609020204030204" pitchFamily="49" charset="0"/>
-                <a:ea typeface="+mn-ea"/>
-                <a:cs typeface="+mn-cs"/>
-              </a:rPr>
-              <a:t>.</a:t>
-            </a:r>
-            <a:r>
-              <a:rPr lang="en-US" sz="1908" kern="1200" err="1">
-                <a:solidFill>
-                  <a:srgbClr val="E5C07B"/>
-                </a:solidFill>
-                <a:latin typeface="Consolas" panose="020B0609020204030204" pitchFamily="49" charset="0"/>
-                <a:ea typeface="+mn-ea"/>
-                <a:cs typeface="+mn-cs"/>
-              </a:rPr>
-              <a:t>Gaussian</a:t>
-            </a:r>
-            <a:endParaRPr lang="en-US" sz="1908" kern="1200">
-              <a:solidFill>
-                <a:srgbClr val="E5C07B"/>
-              </a:solidFill>
-              <a:latin typeface="Consolas" panose="020B0609020204030204" pitchFamily="49" charset="0"/>
-              <a:ea typeface="+mn-ea"/>
-              <a:cs typeface="+mn-cs"/>
-            </a:endParaRPr>
-          </a:p>
-          <a:p>
-            <a:pPr defTabSz="969264">
-              <a:spcAft>
-                <a:spcPts val="600"/>
-              </a:spcAft>
-            </a:pPr>
-            <a:r>
-              <a:rPr lang="en-US" sz="1908" kern="1200" err="1">
-                <a:solidFill>
-                  <a:srgbClr val="E5C07B"/>
-                </a:solidFill>
-                <a:latin typeface="Consolas" panose="020B0609020204030204" pitchFamily="49" charset="0"/>
-                <a:ea typeface="+mn-ea"/>
-                <a:cs typeface="+mn-cs"/>
-              </a:rPr>
-              <a:t>gpf</a:t>
-            </a:r>
-            <a:r>
-              <a:rPr lang="en-US" sz="1908" kern="1200" err="1">
-                <a:solidFill>
-                  <a:srgbClr val="ABB2BF"/>
-                </a:solidFill>
-                <a:latin typeface="Consolas" panose="020B0609020204030204" pitchFamily="49" charset="0"/>
-                <a:ea typeface="+mn-ea"/>
-                <a:cs typeface="+mn-cs"/>
-              </a:rPr>
-              <a:t>.</a:t>
-            </a:r>
-            <a:r>
-              <a:rPr lang="en-US" sz="1908" kern="1200" err="1">
-                <a:solidFill>
-                  <a:srgbClr val="E5C07B"/>
-                </a:solidFill>
-                <a:latin typeface="Consolas" panose="020B0609020204030204" pitchFamily="49" charset="0"/>
-                <a:ea typeface="+mn-ea"/>
-                <a:cs typeface="+mn-cs"/>
-              </a:rPr>
-              <a:t>likelihoods</a:t>
-            </a:r>
-            <a:r>
-              <a:rPr lang="en-US" sz="1908" kern="1200" err="1">
-                <a:solidFill>
-                  <a:srgbClr val="ABB2BF"/>
-                </a:solidFill>
-                <a:latin typeface="Consolas" panose="020B0609020204030204" pitchFamily="49" charset="0"/>
-                <a:ea typeface="+mn-ea"/>
-                <a:cs typeface="+mn-cs"/>
-              </a:rPr>
-              <a:t>.</a:t>
-            </a:r>
-            <a:r>
-              <a:rPr lang="en-US" sz="1908" kern="1200" err="1">
-                <a:solidFill>
-                  <a:srgbClr val="E5C07B"/>
-                </a:solidFill>
-                <a:latin typeface="Consolas" panose="020B0609020204030204" pitchFamily="49" charset="0"/>
-                <a:ea typeface="+mn-ea"/>
-                <a:cs typeface="+mn-cs"/>
-              </a:rPr>
-              <a:t>StudentT</a:t>
-            </a:r>
-            <a:r>
-              <a:rPr lang="en-US" sz="1908" kern="1200">
-                <a:solidFill>
-                  <a:srgbClr val="ABB2BF"/>
-                </a:solidFill>
-                <a:latin typeface="Consolas" panose="020B0609020204030204" pitchFamily="49" charset="0"/>
-                <a:ea typeface="+mn-ea"/>
-                <a:cs typeface="+mn-cs"/>
-              </a:rPr>
-              <a:t>?</a:t>
-            </a:r>
-            <a:endParaRPr lang="en-US" b="0">
-              <a:solidFill>
-                <a:srgbClr val="ABB2BF"/>
-              </a:solidFill>
-              <a:effectLst/>
-              <a:latin typeface="Consolas" panose="020B0609020204030204" pitchFamily="49" charset="0"/>
-            </a:endParaRPr>
-          </a:p>
-        </p:txBody>
-      </p:sp>
-      <p:sp>
-        <p:nvSpPr>
-          <p:cNvPr id="12" name="TextBox 11">
-            <a:extLst>
-              <a:ext uri="{FF2B5EF4-FFF2-40B4-BE49-F238E27FC236}">
-                <a16:creationId xmlns:a16="http://schemas.microsoft.com/office/drawing/2014/main" id="{C972326A-7A55-FCA2-7517-F08F3CB0E3A3}"/>
-              </a:ext>
-            </a:extLst>
-          </p:cNvPr>
-          <p:cNvSpPr txBox="1"/>
-          <p:nvPr/>
-        </p:nvSpPr>
-        <p:spPr>
-          <a:xfrm>
-            <a:off x="785672" y="3124144"/>
-            <a:ext cx="4584457" cy="954107"/>
-          </a:xfrm>
-          <a:prstGeom prst="rect">
-            <a:avLst/>
-          </a:prstGeom>
-          <a:noFill/>
-        </p:spPr>
-        <p:txBody>
-          <a:bodyPr wrap="square" rtlCol="0">
-            <a:spAutoFit/>
-          </a:bodyPr>
-          <a:lstStyle/>
-          <a:p>
-            <a:pPr defTabSz="969264">
-              <a:spcAft>
-                <a:spcPts val="600"/>
-              </a:spcAft>
-            </a:pPr>
-            <a:r>
-              <a:rPr lang="en-US" sz="2800" kern="1200" dirty="0">
-                <a:solidFill>
-                  <a:schemeClr val="tx1"/>
-                </a:solidFill>
-                <a:latin typeface="+mn-lt"/>
-                <a:ea typeface="+mn-ea"/>
-                <a:cs typeface="+mn-cs"/>
-              </a:rPr>
-              <a:t>Testing different optimization packages/algorithms</a:t>
-            </a:r>
-            <a:endParaRPr lang="en-US" sz="2800" dirty="0"/>
-          </a:p>
-        </p:txBody>
-      </p:sp>
-    </p:spTree>
-    <p:extLst>
-      <p:ext uri="{BB962C8B-B14F-4D97-AF65-F5344CB8AC3E}">
-        <p14:creationId xmlns:p14="http://schemas.microsoft.com/office/powerpoint/2010/main" val="640580833"/>
-      </p:ext>
-    </p:extLst>
-  </p:cSld>
-  <p:clrMapOvr>
-    <a:masterClrMapping/>
-  </p:clrMapOvr>
-  <mc:AlternateContent xmlns:mc="http://schemas.openxmlformats.org/markup-compatibility/2006" xmlns:p159="http://schemas.microsoft.com/office/powerpoint/2015/09/main">
-    <mc:Choice Requires="p159">
-      <p:transition xmlns:p14="http://schemas.microsoft.com/office/powerpoint/2010/main" p14:dur="250">
-        <p159:morph option="byObject"/>
-      </p:transition>
-    </mc:Choice>
-    <mc:Fallback xmlns="">
-      <p:transition>
-        <p:fade/>
-      </p:transition>
-    </mc:Fallback>
-  </mc:AlternateContent>
-</p:sld>
-</file>
-
-<file path=ppt/slides/slide21.xml><?xml version="1.0" encoding="utf-8"?>
-<p:sld xmlns:a="http://schemas.openxmlformats.org/drawingml/2006/main" xmlns:r="http://schemas.openxmlformats.org/officeDocument/2006/relationships" xmlns:p="http://schemas.openxmlformats.org/presentationml/2006/main">
-  <p:cSld>
-    <p:bg>
-      <p:bgPr>
-        <a:solidFill>
-          <a:schemeClr val="bg1"/>
-        </a:solidFill>
-        <a:effectLst/>
-      </p:bgPr>
-    </p:bg>
-    <p:spTree>
-      <p:nvGrpSpPr>
-        <p:cNvPr id="1" name=""/>
-        <p:cNvGrpSpPr/>
-        <p:nvPr/>
-      </p:nvGrpSpPr>
-      <p:grpSpPr>
-        <a:xfrm>
-          <a:off x="0" y="0"/>
-          <a:ext cx="0" cy="0"/>
-          <a:chOff x="0" y="0"/>
-          <a:chExt cx="0" cy="0"/>
-        </a:xfrm>
-      </p:grpSpPr>
-      <p:sp useBgFill="1">
-        <p:nvSpPr>
           <p:cNvPr id="9" name="Rectangle 8">
             <a:extLst>
               <a:ext uri="{FF2B5EF4-FFF2-40B4-BE49-F238E27FC236}">
@@ -11442,7 +10859,7 @@
 </p:sld>
 </file>
 
-<file path=ppt/slides/slide22.xml><?xml version="1.0" encoding="utf-8"?>
+<file path=ppt/slides/slide21.xml><?xml version="1.0" encoding="utf-8"?>
 <p:sld xmlns:a="http://schemas.openxmlformats.org/drawingml/2006/main" xmlns:r="http://schemas.openxmlformats.org/officeDocument/2006/relationships" xmlns:p="http://schemas.openxmlformats.org/presentationml/2006/main">
   <p:cSld>
     <p:spTree>

</xml_diff>